<commit_message>
added takeover and prae
</commit_message>
<xml_diff>
--- a/Presentation.pptx
+++ b/Presentation.pptx
@@ -5,10 +5,10 @@
     <p:sldMasterId id="2147483648" r:id="rId1"/>
   </p:sldMasterIdLst>
   <p:notesMasterIdLst>
-    <p:notesMasterId r:id="rId26"/>
+    <p:notesMasterId r:id="rId28"/>
   </p:notesMasterIdLst>
   <p:handoutMasterIdLst>
-    <p:handoutMasterId r:id="rId27"/>
+    <p:handoutMasterId r:id="rId29"/>
   </p:handoutMasterIdLst>
   <p:sldIdLst>
     <p:sldId id="256" r:id="rId2"/>
@@ -16,25 +16,27 @@
     <p:sldId id="263" r:id="rId4"/>
     <p:sldId id="262" r:id="rId5"/>
     <p:sldId id="265" r:id="rId6"/>
-    <p:sldId id="280" r:id="rId7"/>
-    <p:sldId id="281" r:id="rId8"/>
-    <p:sldId id="282" r:id="rId9"/>
-    <p:sldId id="283" r:id="rId10"/>
-    <p:sldId id="284" r:id="rId11"/>
-    <p:sldId id="268" r:id="rId12"/>
-    <p:sldId id="269" r:id="rId13"/>
-    <p:sldId id="270" r:id="rId14"/>
-    <p:sldId id="271" r:id="rId15"/>
-    <p:sldId id="272" r:id="rId16"/>
-    <p:sldId id="273" r:id="rId17"/>
-    <p:sldId id="274" r:id="rId18"/>
-    <p:sldId id="275" r:id="rId19"/>
-    <p:sldId id="276" r:id="rId20"/>
-    <p:sldId id="277" r:id="rId21"/>
-    <p:sldId id="278" r:id="rId22"/>
-    <p:sldId id="279" r:id="rId23"/>
-    <p:sldId id="266" r:id="rId24"/>
-    <p:sldId id="267" r:id="rId25"/>
+    <p:sldId id="268" r:id="rId7"/>
+    <p:sldId id="269" r:id="rId8"/>
+    <p:sldId id="270" r:id="rId9"/>
+    <p:sldId id="287" r:id="rId10"/>
+    <p:sldId id="280" r:id="rId11"/>
+    <p:sldId id="281" r:id="rId12"/>
+    <p:sldId id="282" r:id="rId13"/>
+    <p:sldId id="283" r:id="rId14"/>
+    <p:sldId id="284" r:id="rId15"/>
+    <p:sldId id="271" r:id="rId16"/>
+    <p:sldId id="272" r:id="rId17"/>
+    <p:sldId id="273" r:id="rId18"/>
+    <p:sldId id="274" r:id="rId19"/>
+    <p:sldId id="275" r:id="rId20"/>
+    <p:sldId id="276" r:id="rId21"/>
+    <p:sldId id="277" r:id="rId22"/>
+    <p:sldId id="278" r:id="rId23"/>
+    <p:sldId id="279" r:id="rId24"/>
+    <p:sldId id="286" r:id="rId25"/>
+    <p:sldId id="266" r:id="rId26"/>
+    <p:sldId id="267" r:id="rId27"/>
   </p:sldIdLst>
   <p:sldSz cx="13004800" cy="9753600"/>
   <p:notesSz cx="6858000" cy="9144000"/>
@@ -202,7 +204,7 @@
           <a:p>
             <a:fld id="{2C5E210A-AF78-4FC9-820B-626AA2FBE889}" type="datetimeFigureOut">
               <a:rPr lang="de-AT" smtClean="0"/>
-              <a:t>02.04.2015</a:t>
+              <a:t>09.04.2015</a:t>
             </a:fld>
             <a:endParaRPr lang="de-AT" dirty="0"/>
           </a:p>
@@ -608,7 +610,7 @@
     </p:spTree>
     <p:extLst>
       <p:ext uri="{BB962C8B-B14F-4D97-AF65-F5344CB8AC3E}">
-        <p14:creationId xmlns:p14="http://schemas.microsoft.com/office/powerpoint/2010/main" val="131401658"/>
+        <p14:creationId xmlns:p14="http://schemas.microsoft.com/office/powerpoint/2010/main" val="1320669604"/>
       </p:ext>
     </p:extLst>
   </p:cSld>
@@ -681,50 +683,14 @@
             <a:pPr lvl="0">
               <a:defRPr sz="1800"/>
             </a:pPr>
-            <a:r>
-              <a:rPr sz="2200"/>
-              <a:t>Wagen für das Volk - bezahlbar und effizient</a:t>
-            </a:r>
-          </a:p>
-          <a:p>
-            <a:pPr lvl="0">
-              <a:defRPr sz="1800"/>
-            </a:pPr>
-            <a:r>
-              <a:rPr sz="2200"/>
-              <a:t>Angestoßen durch Hitler: Gründung der Gesellschaft zur Vorbereitung des Deutschen Volkswagen mbH</a:t>
-            </a:r>
-          </a:p>
-          <a:p>
-            <a:pPr lvl="0">
-              <a:defRPr sz="1800"/>
-            </a:pPr>
-            <a:r>
-              <a:rPr sz="2200"/>
-              <a:t>Umbenennung zu: Volkswagenwerk GmbH</a:t>
-            </a:r>
-          </a:p>
-          <a:p>
-            <a:pPr lvl="0">
-              <a:defRPr sz="1800"/>
-            </a:pPr>
-            <a:r>
-              <a:rPr sz="2200"/>
-              <a:t>KdF Kraft durch Freude Wagen</a:t>
-            </a:r>
-          </a:p>
-          <a:p>
-            <a:pPr lvl="0">
-              <a:defRPr sz="1800"/>
-            </a:pPr>
-            <a:endParaRPr sz="2200"/>
+            <a:endParaRPr lang="de-AT" sz="2200" dirty="0" smtClean="0"/>
           </a:p>
         </p:txBody>
       </p:sp>
     </p:spTree>
     <p:extLst>
       <p:ext uri="{BB962C8B-B14F-4D97-AF65-F5344CB8AC3E}">
-        <p14:creationId xmlns:p14="http://schemas.microsoft.com/office/powerpoint/2010/main" val="2582998507"/>
+        <p14:creationId xmlns:p14="http://schemas.microsoft.com/office/powerpoint/2010/main" val="2478551123"/>
       </p:ext>
     </p:extLst>
   </p:cSld>
@@ -797,49 +763,14 @@
             <a:pPr lvl="0">
               <a:defRPr sz="1800"/>
             </a:pPr>
-            <a:r>
-              <a:rPr lang="de-AT" sz="2200" dirty="0" smtClean="0"/>
-              <a:t>Umstellung auf Rüstungsgüter und andere im Krieg benötigte Waren, beispielsweise die Vergeltungswaffe 1, die erste Boden Luft Rakete</a:t>
-            </a:r>
-          </a:p>
-          <a:p>
-            <a:pPr lvl="0">
-              <a:defRPr sz="1800"/>
-            </a:pPr>
-            <a:r>
-              <a:rPr lang="de-AT" sz="2200" dirty="0" smtClean="0"/>
-              <a:t>das KZ Arbeitsdorf lieferte von 1942 - 45 </a:t>
-            </a:r>
-            <a:r>
-              <a:rPr lang="de-AT" sz="2200" dirty="0" err="1" smtClean="0"/>
-              <a:t>ca</a:t>
-            </a:r>
-            <a:r>
-              <a:rPr lang="de-AT" sz="2200" dirty="0" smtClean="0"/>
-              <a:t> 20.000 Arbeitskräfte für das Werk</a:t>
-            </a:r>
-          </a:p>
-          <a:p>
-            <a:pPr lvl="0">
-              <a:defRPr sz="1800"/>
-            </a:pPr>
-            <a:r>
-              <a:rPr lang="de-AT" sz="2200" dirty="0" smtClean="0"/>
-              <a:t>Ende des Krieges war das Werk größtenteils intakt, und ging zunächst an die Britische Militärregierung</a:t>
-            </a:r>
-          </a:p>
-          <a:p>
-            <a:pPr lvl="0">
-              <a:defRPr sz="1800"/>
-            </a:pPr>
-            <a:endParaRPr sz="2200" dirty="0"/>
+            <a:endParaRPr lang="de-AT" sz="2200" dirty="0" smtClean="0"/>
           </a:p>
         </p:txBody>
       </p:sp>
     </p:spTree>
     <p:extLst>
       <p:ext uri="{BB962C8B-B14F-4D97-AF65-F5344CB8AC3E}">
-        <p14:creationId xmlns:p14="http://schemas.microsoft.com/office/powerpoint/2010/main" val="115033856"/>
+        <p14:creationId xmlns:p14="http://schemas.microsoft.com/office/powerpoint/2010/main" val="2121702000"/>
       </p:ext>
     </p:extLst>
   </p:cSld>
@@ -912,67 +843,14 @@
             <a:pPr lvl="0">
               <a:defRPr sz="1800"/>
             </a:pPr>
-            <a:r>
-              <a:rPr lang="de-AT" sz="2200" dirty="0" smtClean="0"/>
-              <a:t>Nach dem Krieg werden in Wolfsburg wieder Autos hergestellt, nämlich der Käfer</a:t>
-            </a:r>
-          </a:p>
-          <a:p>
-            <a:pPr lvl="0">
-              <a:defRPr sz="1800"/>
-            </a:pPr>
-            <a:r>
-              <a:rPr lang="de-AT" sz="2200" dirty="0" smtClean="0"/>
-              <a:t>in nur 10 Jahren seit Kriegsende schafft es VW eine Million Käfer zu produzieren</a:t>
-            </a:r>
-          </a:p>
-          <a:p>
-            <a:pPr lvl="0">
-              <a:defRPr sz="1800"/>
-            </a:pPr>
-            <a:r>
-              <a:rPr lang="de-AT" sz="2200" dirty="0" smtClean="0"/>
-              <a:t>1960 wird VW von einer GmbH zu einer Aktiengesellschaft</a:t>
-            </a:r>
-          </a:p>
-          <a:p>
-            <a:pPr lvl="0">
-              <a:defRPr sz="1800"/>
-            </a:pPr>
-            <a:r>
-              <a:rPr lang="de-AT" sz="2200" dirty="0" smtClean="0"/>
-              <a:t>1969 durch </a:t>
-            </a:r>
-            <a:r>
-              <a:rPr lang="de-AT" sz="2200" dirty="0" err="1" smtClean="0"/>
-              <a:t>erwerb</a:t>
-            </a:r>
-            <a:r>
-              <a:rPr lang="de-AT" sz="2200" dirty="0" smtClean="0"/>
-              <a:t> der Auto Union bekommt VW seine erste weitere Marke - Audi</a:t>
-            </a:r>
-          </a:p>
-          <a:p>
-            <a:pPr lvl="0">
-              <a:defRPr sz="1800"/>
-            </a:pPr>
-            <a:r>
-              <a:rPr lang="de-AT" sz="2200" dirty="0" smtClean="0"/>
-              <a:t>73,74 Erfolgsmodelle Passat, Golf</a:t>
-            </a:r>
-          </a:p>
-          <a:p>
-            <a:pPr lvl="0">
-              <a:defRPr sz="1800"/>
-            </a:pPr>
-            <a:endParaRPr sz="2200" dirty="0"/>
+            <a:endParaRPr lang="de-AT" sz="2200" dirty="0" smtClean="0"/>
           </a:p>
         </p:txBody>
       </p:sp>
     </p:spTree>
     <p:extLst>
       <p:ext uri="{BB962C8B-B14F-4D97-AF65-F5344CB8AC3E}">
-        <p14:creationId xmlns:p14="http://schemas.microsoft.com/office/powerpoint/2010/main" val="1979351376"/>
+        <p14:creationId xmlns:p14="http://schemas.microsoft.com/office/powerpoint/2010/main" val="3085683135"/>
       </p:ext>
     </p:extLst>
   </p:cSld>
@@ -1045,99 +923,14 @@
             <a:pPr lvl="0">
               <a:defRPr sz="1800"/>
             </a:pPr>
-            <a:r>
-              <a:rPr lang="de-AT" sz="2200" dirty="0" smtClean="0"/>
-              <a:t>2003 Gewinneinbruch wegen </a:t>
-            </a:r>
-            <a:r>
-              <a:rPr lang="de-AT" sz="2200" dirty="0" err="1" smtClean="0"/>
-              <a:t>restukturierungen</a:t>
-            </a:r>
-            <a:r>
-              <a:rPr lang="de-AT" sz="2200" dirty="0" smtClean="0"/>
-              <a:t> in Brasilien (3stlg </a:t>
-            </a:r>
-            <a:r>
-              <a:rPr lang="de-AT" sz="2200" dirty="0" err="1" smtClean="0"/>
-              <a:t>Mio</a:t>
-            </a:r>
-            <a:r>
-              <a:rPr lang="de-AT" sz="2200" dirty="0" smtClean="0"/>
-              <a:t> betrag), </a:t>
-            </a:r>
-            <a:r>
-              <a:rPr lang="de-AT" sz="2200" dirty="0" err="1" smtClean="0"/>
-              <a:t>rekordzahl</a:t>
-            </a:r>
-            <a:r>
-              <a:rPr lang="de-AT" sz="2200" dirty="0" smtClean="0"/>
-              <a:t> an neuen Modellen und </a:t>
-            </a:r>
-            <a:r>
-              <a:rPr lang="de-AT" sz="2200" dirty="0" err="1" smtClean="0"/>
-              <a:t>Schlehter</a:t>
-            </a:r>
-            <a:r>
-              <a:rPr lang="de-AT" sz="2200" dirty="0" smtClean="0"/>
-              <a:t> Weltmarktsituation</a:t>
-            </a:r>
-          </a:p>
-          <a:p>
-            <a:pPr lvl="0">
-              <a:defRPr sz="1800"/>
-            </a:pPr>
-            <a:r>
-              <a:rPr lang="de-AT" sz="2200" dirty="0" smtClean="0"/>
-              <a:t>2005 </a:t>
-            </a:r>
-            <a:r>
-              <a:rPr lang="de-AT" sz="2200" dirty="0" err="1" smtClean="0"/>
-              <a:t>Korrupitionssk</a:t>
-            </a:r>
-            <a:r>
-              <a:rPr lang="de-AT" sz="2200" dirty="0" smtClean="0"/>
-              <a:t>., Umfassende Streiks in Brasilianischem Werk</a:t>
-            </a:r>
-          </a:p>
-          <a:p>
-            <a:pPr lvl="0">
-              <a:defRPr sz="1800"/>
-            </a:pPr>
-            <a:r>
-              <a:rPr lang="de-AT" sz="2200" dirty="0" smtClean="0"/>
-              <a:t>2014: 10,14 </a:t>
-            </a:r>
-            <a:r>
-              <a:rPr lang="de-AT" sz="2200" dirty="0" err="1" smtClean="0"/>
-              <a:t>Mio</a:t>
-            </a:r>
-            <a:r>
-              <a:rPr lang="de-AT" sz="2200" dirty="0" smtClean="0"/>
-              <a:t> Fahrzeuge, knapp hinter Toyota 10,23, beide haben in dem Jahr die 10 Millionen Marke geknackt, dieses Jahr </a:t>
-            </a:r>
-            <a:r>
-              <a:rPr lang="de-AT" sz="2200" dirty="0" err="1" smtClean="0"/>
-              <a:t>evtl</a:t>
-            </a:r>
-            <a:r>
-              <a:rPr lang="de-AT" sz="2200" dirty="0" smtClean="0"/>
-              <a:t> größter Weltweit (Toyota </a:t>
-            </a:r>
-            <a:r>
-              <a:rPr lang="de-AT" sz="2200" dirty="0" err="1" smtClean="0"/>
-              <a:t>einbußen</a:t>
-            </a:r>
-            <a:r>
-              <a:rPr lang="de-AT" sz="2200" dirty="0" smtClean="0"/>
-              <a:t> in JP)</a:t>
-            </a:r>
+            <a:endParaRPr lang="de-AT" sz="2200" dirty="0" smtClean="0"/>
           </a:p>
         </p:txBody>
       </p:sp>
     </p:spTree>
     <p:extLst>
       <p:ext uri="{BB962C8B-B14F-4D97-AF65-F5344CB8AC3E}">
-        <p14:creationId xmlns:p14="http://schemas.microsoft.com/office/powerpoint/2010/main" val="2232635240"/>
+        <p14:creationId xmlns:p14="http://schemas.microsoft.com/office/powerpoint/2010/main" val="131401658"/>
       </p:ext>
     </p:extLst>
   </p:cSld>
@@ -1302,7 +1095,7 @@
     </p:spTree>
     <p:extLst>
       <p:ext uri="{BB962C8B-B14F-4D97-AF65-F5344CB8AC3E}">
-        <p14:creationId xmlns:p14="http://schemas.microsoft.com/office/powerpoint/2010/main" val="31560538"/>
+        <p14:creationId xmlns:p14="http://schemas.microsoft.com/office/powerpoint/2010/main" val="2232635240"/>
       </p:ext>
     </p:extLst>
   </p:cSld>
@@ -1467,7 +1260,7 @@
     </p:spTree>
     <p:extLst>
       <p:ext uri="{BB962C8B-B14F-4D97-AF65-F5344CB8AC3E}">
-        <p14:creationId xmlns:p14="http://schemas.microsoft.com/office/powerpoint/2010/main" val="3036472135"/>
+        <p14:creationId xmlns:p14="http://schemas.microsoft.com/office/powerpoint/2010/main" val="31560538"/>
       </p:ext>
     </p:extLst>
   </p:cSld>
@@ -1632,7 +1425,7 @@
     </p:spTree>
     <p:extLst>
       <p:ext uri="{BB962C8B-B14F-4D97-AF65-F5344CB8AC3E}">
-        <p14:creationId xmlns:p14="http://schemas.microsoft.com/office/powerpoint/2010/main" val="1914828758"/>
+        <p14:creationId xmlns:p14="http://schemas.microsoft.com/office/powerpoint/2010/main" val="3036472135"/>
       </p:ext>
     </p:extLst>
   </p:cSld>
@@ -1707,47 +1500,97 @@
             </a:pPr>
             <a:r>
               <a:rPr lang="de-AT" sz="2200" dirty="0" smtClean="0"/>
-              <a:t>Umstellung auf Rüstungsgüter und andere im Krieg benötigte Waren, beispielsweise die Vergeltungswaffe 1, die erste Boden Luft Rakete</a:t>
-            </a:r>
-          </a:p>
-          <a:p>
-            <a:pPr lvl="0">
-              <a:defRPr sz="1800"/>
-            </a:pPr>
+              <a:t>2003 Gewinneinbruch wegen </a:t>
+            </a:r>
+            <a:r>
+              <a:rPr lang="de-AT" sz="2200" dirty="0" err="1" smtClean="0"/>
+              <a:t>restukturierungen</a:t>
+            </a:r>
             <a:r>
               <a:rPr lang="de-AT" sz="2200" dirty="0" smtClean="0"/>
-              <a:t>das KZ Arbeitsdorf lieferte von 1942 - 45 </a:t>
+              <a:t> in Brasilien (3stlg </a:t>
             </a:r>
             <a:r>
               <a:rPr lang="de-AT" sz="2200" dirty="0" err="1" smtClean="0"/>
-              <a:t>ca</a:t>
+              <a:t>Mio</a:t>
             </a:r>
             <a:r>
               <a:rPr lang="de-AT" sz="2200" dirty="0" smtClean="0"/>
-              <a:t> 20.000 Arbeitskräfte für das Werk</a:t>
-            </a:r>
-          </a:p>
-          <a:p>
-            <a:pPr lvl="0">
-              <a:defRPr sz="1800"/>
-            </a:pPr>
+              <a:t> betrag), </a:t>
+            </a:r>
+            <a:r>
+              <a:rPr lang="de-AT" sz="2200" dirty="0" err="1" smtClean="0"/>
+              <a:t>rekordzahl</a:t>
+            </a:r>
             <a:r>
               <a:rPr lang="de-AT" sz="2200" dirty="0" smtClean="0"/>
-              <a:t>Ende des Krieges war das Werk größtenteils intakt, und ging zunächst an die Britische Militärregierung</a:t>
-            </a:r>
-          </a:p>
-          <a:p>
-            <a:pPr lvl="0">
-              <a:defRPr sz="1800"/>
-            </a:pPr>
-            <a:endParaRPr sz="2200" dirty="0"/>
+              <a:t> an neuen Modellen und </a:t>
+            </a:r>
+            <a:r>
+              <a:rPr lang="de-AT" sz="2200" dirty="0" err="1" smtClean="0"/>
+              <a:t>Schlehter</a:t>
+            </a:r>
+            <a:r>
+              <a:rPr lang="de-AT" sz="2200" dirty="0" smtClean="0"/>
+              <a:t> Weltmarktsituation</a:t>
+            </a:r>
+          </a:p>
+          <a:p>
+            <a:pPr lvl="0">
+              <a:defRPr sz="1800"/>
+            </a:pPr>
+            <a:r>
+              <a:rPr lang="de-AT" sz="2200" dirty="0" smtClean="0"/>
+              <a:t>2005 </a:t>
+            </a:r>
+            <a:r>
+              <a:rPr lang="de-AT" sz="2200" dirty="0" err="1" smtClean="0"/>
+              <a:t>Korrupitionssk</a:t>
+            </a:r>
+            <a:r>
+              <a:rPr lang="de-AT" sz="2200" dirty="0" smtClean="0"/>
+              <a:t>., Umfassende Streiks in Brasilianischem Werk</a:t>
+            </a:r>
+          </a:p>
+          <a:p>
+            <a:pPr lvl="0">
+              <a:defRPr sz="1800"/>
+            </a:pPr>
+            <a:r>
+              <a:rPr lang="de-AT" sz="2200" dirty="0" smtClean="0"/>
+              <a:t>2014: 10,14 </a:t>
+            </a:r>
+            <a:r>
+              <a:rPr lang="de-AT" sz="2200" dirty="0" err="1" smtClean="0"/>
+              <a:t>Mio</a:t>
+            </a:r>
+            <a:r>
+              <a:rPr lang="de-AT" sz="2200" dirty="0" smtClean="0"/>
+              <a:t> Fahrzeuge, knapp hinter Toyota 10,23, beide haben in dem Jahr die 10 Millionen Marke geknackt, dieses Jahr </a:t>
+            </a:r>
+            <a:r>
+              <a:rPr lang="de-AT" sz="2200" dirty="0" err="1" smtClean="0"/>
+              <a:t>evtl</a:t>
+            </a:r>
+            <a:r>
+              <a:rPr lang="de-AT" sz="2200" dirty="0" smtClean="0"/>
+              <a:t> größter Weltweit (Toyota </a:t>
+            </a:r>
+            <a:r>
+              <a:rPr lang="de-AT" sz="2200" dirty="0" err="1" smtClean="0"/>
+              <a:t>einbußen</a:t>
+            </a:r>
+            <a:r>
+              <a:rPr lang="de-AT" sz="2200" dirty="0" smtClean="0"/>
+              <a:t> in JP)</a:t>
+            </a:r>
           </a:p>
         </p:txBody>
       </p:sp>
     </p:spTree>
     <p:extLst>
       <p:ext uri="{BB962C8B-B14F-4D97-AF65-F5344CB8AC3E}">
-        <p14:creationId xmlns:p14="http://schemas.microsoft.com/office/powerpoint/2010/main" val="3678079855"/>
+        <p14:creationId xmlns:p14="http://schemas.microsoft.com/office/powerpoint/2010/main" val="1914828758"/>
       </p:ext>
     </p:extLst>
   </p:cSld>
@@ -1820,6 +1663,41 @@
             <a:pPr lvl="0">
               <a:defRPr sz="1800"/>
             </a:pPr>
+            <a:r>
+              <a:rPr lang="de-AT" sz="2200" dirty="0" smtClean="0"/>
+              <a:t>Umstellung auf Rüstungsgüter und andere im Krieg benötigte Waren, beispielsweise die Vergeltungswaffe 1, die erste Boden Luft Rakete</a:t>
+            </a:r>
+          </a:p>
+          <a:p>
+            <a:pPr lvl="0">
+              <a:defRPr sz="1800"/>
+            </a:pPr>
+            <a:r>
+              <a:rPr lang="de-AT" sz="2200" dirty="0" smtClean="0"/>
+              <a:t>das KZ Arbeitsdorf lieferte von 1942 - 45 </a:t>
+            </a:r>
+            <a:r>
+              <a:rPr lang="de-AT" sz="2200" dirty="0" err="1" smtClean="0"/>
+              <a:t>ca</a:t>
+            </a:r>
+            <a:r>
+              <a:rPr lang="de-AT" sz="2200" dirty="0" smtClean="0"/>
+              <a:t> 20.000 Arbeitskräfte für das Werk</a:t>
+            </a:r>
+          </a:p>
+          <a:p>
+            <a:pPr lvl="0">
+              <a:defRPr sz="1800"/>
+            </a:pPr>
+            <a:r>
+              <a:rPr lang="de-AT" sz="2200" dirty="0" smtClean="0"/>
+              <a:t>Ende des Krieges war das Werk größtenteils intakt, und ging zunächst an die Britische Militärregierung</a:t>
+            </a:r>
+          </a:p>
+          <a:p>
+            <a:pPr lvl="0">
+              <a:defRPr sz="1800"/>
+            </a:pPr>
             <a:endParaRPr sz="2200" dirty="0"/>
           </a:p>
         </p:txBody>
@@ -1827,7 +1705,7 @@
     </p:spTree>
     <p:extLst>
       <p:ext uri="{BB962C8B-B14F-4D97-AF65-F5344CB8AC3E}">
-        <p14:creationId xmlns:p14="http://schemas.microsoft.com/office/powerpoint/2010/main" val="2946526158"/>
+        <p14:creationId xmlns:p14="http://schemas.microsoft.com/office/powerpoint/2010/main" val="3678079855"/>
       </p:ext>
     </p:extLst>
   </p:cSld>
@@ -2023,7 +1901,7 @@
     </p:spTree>
     <p:extLst>
       <p:ext uri="{BB962C8B-B14F-4D97-AF65-F5344CB8AC3E}">
-        <p14:creationId xmlns:p14="http://schemas.microsoft.com/office/powerpoint/2010/main" val="2850501437"/>
+        <p14:creationId xmlns:p14="http://schemas.microsoft.com/office/powerpoint/2010/main" val="2946526158"/>
       </p:ext>
     </p:extLst>
   </p:cSld>
@@ -2103,7 +1981,7 @@
     </p:spTree>
     <p:extLst>
       <p:ext uri="{BB962C8B-B14F-4D97-AF65-F5344CB8AC3E}">
-        <p14:creationId xmlns:p14="http://schemas.microsoft.com/office/powerpoint/2010/main" val="4165192125"/>
+        <p14:creationId xmlns:p14="http://schemas.microsoft.com/office/powerpoint/2010/main" val="2850501437"/>
       </p:ext>
     </p:extLst>
   </p:cSld>
@@ -2150,7 +2028,7 @@
           <a:lstStyle/>
           <a:p>
             <a:pPr lvl="0"/>
-            <a:endParaRPr dirty="0"/>
+            <a:endParaRPr/>
           </a:p>
         </p:txBody>
       </p:sp>
@@ -2183,7 +2061,7 @@
     </p:spTree>
     <p:extLst>
       <p:ext uri="{BB962C8B-B14F-4D97-AF65-F5344CB8AC3E}">
-        <p14:creationId xmlns:p14="http://schemas.microsoft.com/office/powerpoint/2010/main" val="1990788364"/>
+        <p14:creationId xmlns:p14="http://schemas.microsoft.com/office/powerpoint/2010/main" val="4165192125"/>
       </p:ext>
     </p:extLst>
   </p:cSld>
@@ -2256,6 +2134,166 @@
             <a:pPr lvl="0">
               <a:defRPr sz="1800"/>
             </a:pPr>
+            <a:endParaRPr sz="2200" dirty="0"/>
+          </a:p>
+        </p:txBody>
+      </p:sp>
+    </p:spTree>
+    <p:extLst>
+      <p:ext uri="{BB962C8B-B14F-4D97-AF65-F5344CB8AC3E}">
+        <p14:creationId xmlns:p14="http://schemas.microsoft.com/office/powerpoint/2010/main" val="1990788364"/>
+      </p:ext>
+    </p:extLst>
+  </p:cSld>
+  <p:clrMapOvr>
+    <a:masterClrMapping/>
+  </p:clrMapOvr>
+</p:notes>
+</file>
+
+<file path=ppt/notesSlides/notesSlide24.xml><?xml version="1.0" encoding="utf-8"?>
+<p:notes xmlns:a="http://schemas.openxmlformats.org/drawingml/2006/main" xmlns:r="http://schemas.openxmlformats.org/officeDocument/2006/relationships" xmlns:p="http://schemas.openxmlformats.org/presentationml/2006/main">
+  <p:cSld>
+    <p:spTree>
+      <p:nvGrpSpPr>
+        <p:cNvPr id="1" name=""/>
+        <p:cNvGrpSpPr/>
+        <p:nvPr/>
+      </p:nvGrpSpPr>
+      <p:grpSpPr>
+        <a:xfrm>
+          <a:off x="0" y="0"/>
+          <a:ext cx="0" cy="0"/>
+          <a:chOff x="0" y="0"/>
+          <a:chExt cx="0" cy="0"/>
+        </a:xfrm>
+      </p:grpSpPr>
+      <p:sp>
+        <p:nvSpPr>
+          <p:cNvPr id="37" name="Shape 37"/>
+          <p:cNvSpPr>
+            <a:spLocks noGrp="1" noRot="1" noChangeAspect="1"/>
+          </p:cNvSpPr>
+          <p:nvPr>
+            <p:ph type="sldImg"/>
+          </p:nvPr>
+        </p:nvSpPr>
+        <p:spPr>
+          <a:prstGeom prst="rect">
+            <a:avLst/>
+          </a:prstGeom>
+        </p:spPr>
+        <p:txBody>
+          <a:bodyPr/>
+          <a:lstStyle/>
+          <a:p>
+            <a:pPr lvl="0"/>
+            <a:endParaRPr dirty="0"/>
+          </a:p>
+        </p:txBody>
+      </p:sp>
+      <p:sp>
+        <p:nvSpPr>
+          <p:cNvPr id="38" name="Shape 38"/>
+          <p:cNvSpPr>
+            <a:spLocks noGrp="1"/>
+          </p:cNvSpPr>
+          <p:nvPr>
+            <p:ph type="body" sz="quarter" idx="1"/>
+          </p:nvPr>
+        </p:nvSpPr>
+        <p:spPr>
+          <a:prstGeom prst="rect">
+            <a:avLst/>
+          </a:prstGeom>
+        </p:spPr>
+        <p:txBody>
+          <a:bodyPr/>
+          <a:lstStyle/>
+          <a:p>
+            <a:pPr lvl="0">
+              <a:defRPr sz="1800"/>
+            </a:pPr>
+            <a:endParaRPr sz="2200" dirty="0"/>
+          </a:p>
+        </p:txBody>
+      </p:sp>
+    </p:spTree>
+    <p:extLst>
+      <p:ext uri="{BB962C8B-B14F-4D97-AF65-F5344CB8AC3E}">
+        <p14:creationId xmlns:p14="http://schemas.microsoft.com/office/powerpoint/2010/main" val="1345253853"/>
+      </p:ext>
+    </p:extLst>
+  </p:cSld>
+  <p:clrMapOvr>
+    <a:masterClrMapping/>
+  </p:clrMapOvr>
+</p:notes>
+</file>
+
+<file path=ppt/notesSlides/notesSlide25.xml><?xml version="1.0" encoding="utf-8"?>
+<p:notes xmlns:a="http://schemas.openxmlformats.org/drawingml/2006/main" xmlns:r="http://schemas.openxmlformats.org/officeDocument/2006/relationships" xmlns:p="http://schemas.openxmlformats.org/presentationml/2006/main">
+  <p:cSld>
+    <p:spTree>
+      <p:nvGrpSpPr>
+        <p:cNvPr id="1" name=""/>
+        <p:cNvGrpSpPr/>
+        <p:nvPr/>
+      </p:nvGrpSpPr>
+      <p:grpSpPr>
+        <a:xfrm>
+          <a:off x="0" y="0"/>
+          <a:ext cx="0" cy="0"/>
+          <a:chOff x="0" y="0"/>
+          <a:chExt cx="0" cy="0"/>
+        </a:xfrm>
+      </p:grpSpPr>
+      <p:sp>
+        <p:nvSpPr>
+          <p:cNvPr id="37" name="Shape 37"/>
+          <p:cNvSpPr>
+            <a:spLocks noGrp="1" noRot="1" noChangeAspect="1"/>
+          </p:cNvSpPr>
+          <p:nvPr>
+            <p:ph type="sldImg"/>
+          </p:nvPr>
+        </p:nvSpPr>
+        <p:spPr>
+          <a:prstGeom prst="rect">
+            <a:avLst/>
+          </a:prstGeom>
+        </p:spPr>
+        <p:txBody>
+          <a:bodyPr/>
+          <a:lstStyle/>
+          <a:p>
+            <a:pPr lvl="0"/>
+            <a:endParaRPr dirty="0"/>
+          </a:p>
+        </p:txBody>
+      </p:sp>
+      <p:sp>
+        <p:nvSpPr>
+          <p:cNvPr id="38" name="Shape 38"/>
+          <p:cNvSpPr>
+            <a:spLocks noGrp="1"/>
+          </p:cNvSpPr>
+          <p:nvPr>
+            <p:ph type="body" sz="quarter" idx="1"/>
+          </p:nvPr>
+        </p:nvSpPr>
+        <p:spPr>
+          <a:prstGeom prst="rect">
+            <a:avLst/>
+          </a:prstGeom>
+        </p:spPr>
+        <p:txBody>
+          <a:bodyPr/>
+          <a:lstStyle/>
+          <a:p>
+            <a:pPr lvl="0">
+              <a:defRPr sz="1800"/>
+            </a:pPr>
             <a:endParaRPr lang="de-AT" sz="2200" dirty="0" smtClean="0"/>
           </a:p>
         </p:txBody>
@@ -2273,7 +2311,7 @@
 </p:notes>
 </file>
 
-<file path=ppt/notesSlides/notesSlide24.xml><?xml version="1.0" encoding="utf-8"?>
+<file path=ppt/notesSlides/notesSlide26.xml><?xml version="1.0" encoding="utf-8"?>
 <p:notes xmlns:a="http://schemas.openxmlformats.org/drawingml/2006/main" xmlns:r="http://schemas.openxmlformats.org/officeDocument/2006/relationships" xmlns:p="http://schemas.openxmlformats.org/presentationml/2006/main">
   <p:cSld>
     <p:spTree>
@@ -2829,14 +2867,50 @@
             <a:pPr lvl="0">
               <a:defRPr sz="1800"/>
             </a:pPr>
-            <a:endParaRPr lang="de-AT" sz="2200" dirty="0" smtClean="0"/>
+            <a:r>
+              <a:rPr sz="2200"/>
+              <a:t>Wagen für das Volk - bezahlbar und effizient</a:t>
+            </a:r>
+          </a:p>
+          <a:p>
+            <a:pPr lvl="0">
+              <a:defRPr sz="1800"/>
+            </a:pPr>
+            <a:r>
+              <a:rPr sz="2200"/>
+              <a:t>Angestoßen durch Hitler: Gründung der Gesellschaft zur Vorbereitung des Deutschen Volkswagen mbH</a:t>
+            </a:r>
+          </a:p>
+          <a:p>
+            <a:pPr lvl="0">
+              <a:defRPr sz="1800"/>
+            </a:pPr>
+            <a:r>
+              <a:rPr sz="2200"/>
+              <a:t>Umbenennung zu: Volkswagenwerk GmbH</a:t>
+            </a:r>
+          </a:p>
+          <a:p>
+            <a:pPr lvl="0">
+              <a:defRPr sz="1800"/>
+            </a:pPr>
+            <a:r>
+              <a:rPr sz="2200"/>
+              <a:t>KdF Kraft durch Freude Wagen</a:t>
+            </a:r>
+          </a:p>
+          <a:p>
+            <a:pPr lvl="0">
+              <a:defRPr sz="1800"/>
+            </a:pPr>
+            <a:endParaRPr sz="2200"/>
           </a:p>
         </p:txBody>
       </p:sp>
     </p:spTree>
     <p:extLst>
       <p:ext uri="{BB962C8B-B14F-4D97-AF65-F5344CB8AC3E}">
-        <p14:creationId xmlns:p14="http://schemas.microsoft.com/office/powerpoint/2010/main" val="1320669604"/>
+        <p14:creationId xmlns:p14="http://schemas.microsoft.com/office/powerpoint/2010/main" val="2582998507"/>
       </p:ext>
     </p:extLst>
   </p:cSld>
@@ -2909,14 +2983,49 @@
             <a:pPr lvl="0">
               <a:defRPr sz="1800"/>
             </a:pPr>
-            <a:endParaRPr lang="de-AT" sz="2200" dirty="0" smtClean="0"/>
+            <a:r>
+              <a:rPr lang="de-AT" sz="2200" dirty="0" smtClean="0"/>
+              <a:t>Umstellung auf Rüstungsgüter und andere im Krieg benötigte Waren, beispielsweise die Vergeltungswaffe 1, die erste Boden Luft Rakete</a:t>
+            </a:r>
+          </a:p>
+          <a:p>
+            <a:pPr lvl="0">
+              <a:defRPr sz="1800"/>
+            </a:pPr>
+            <a:r>
+              <a:rPr lang="de-AT" sz="2200" dirty="0" smtClean="0"/>
+              <a:t>das KZ Arbeitsdorf lieferte von 1942 - 45 </a:t>
+            </a:r>
+            <a:r>
+              <a:rPr lang="de-AT" sz="2200" dirty="0" err="1" smtClean="0"/>
+              <a:t>ca</a:t>
+            </a:r>
+            <a:r>
+              <a:rPr lang="de-AT" sz="2200" dirty="0" smtClean="0"/>
+              <a:t> 20.000 Arbeitskräfte für das Werk</a:t>
+            </a:r>
+          </a:p>
+          <a:p>
+            <a:pPr lvl="0">
+              <a:defRPr sz="1800"/>
+            </a:pPr>
+            <a:r>
+              <a:rPr lang="de-AT" sz="2200" dirty="0" smtClean="0"/>
+              <a:t>Ende des Krieges war das Werk größtenteils intakt, und ging zunächst an die Britische Militärregierung</a:t>
+            </a:r>
+          </a:p>
+          <a:p>
+            <a:pPr lvl="0">
+              <a:defRPr sz="1800"/>
+            </a:pPr>
+            <a:endParaRPr sz="2200" dirty="0"/>
           </a:p>
         </p:txBody>
       </p:sp>
     </p:spTree>
     <p:extLst>
       <p:ext uri="{BB962C8B-B14F-4D97-AF65-F5344CB8AC3E}">
-        <p14:creationId xmlns:p14="http://schemas.microsoft.com/office/powerpoint/2010/main" val="2478551123"/>
+        <p14:creationId xmlns:p14="http://schemas.microsoft.com/office/powerpoint/2010/main" val="115033856"/>
       </p:ext>
     </p:extLst>
   </p:cSld>
@@ -2989,14 +3098,67 @@
             <a:pPr lvl="0">
               <a:defRPr sz="1800"/>
             </a:pPr>
-            <a:endParaRPr lang="de-AT" sz="2200" dirty="0" smtClean="0"/>
+            <a:r>
+              <a:rPr lang="de-AT" sz="2200" dirty="0" smtClean="0"/>
+              <a:t>Nach dem Krieg werden in Wolfsburg wieder Autos hergestellt, nämlich der Käfer</a:t>
+            </a:r>
+          </a:p>
+          <a:p>
+            <a:pPr lvl="0">
+              <a:defRPr sz="1800"/>
+            </a:pPr>
+            <a:r>
+              <a:rPr lang="de-AT" sz="2200" dirty="0" smtClean="0"/>
+              <a:t>in nur 10 Jahren seit Kriegsende schafft es VW eine Million Käfer zu produzieren</a:t>
+            </a:r>
+          </a:p>
+          <a:p>
+            <a:pPr lvl="0">
+              <a:defRPr sz="1800"/>
+            </a:pPr>
+            <a:r>
+              <a:rPr lang="de-AT" sz="2200" dirty="0" smtClean="0"/>
+              <a:t>1960 wird VW von einer GmbH zu einer Aktiengesellschaft</a:t>
+            </a:r>
+          </a:p>
+          <a:p>
+            <a:pPr lvl="0">
+              <a:defRPr sz="1800"/>
+            </a:pPr>
+            <a:r>
+              <a:rPr lang="de-AT" sz="2200" dirty="0" smtClean="0"/>
+              <a:t>1969 durch </a:t>
+            </a:r>
+            <a:r>
+              <a:rPr lang="de-AT" sz="2200" dirty="0" err="1" smtClean="0"/>
+              <a:t>erwerb</a:t>
+            </a:r>
+            <a:r>
+              <a:rPr lang="de-AT" sz="2200" dirty="0" smtClean="0"/>
+              <a:t> der Auto Union bekommt VW seine erste weitere Marke - Audi</a:t>
+            </a:r>
+          </a:p>
+          <a:p>
+            <a:pPr lvl="0">
+              <a:defRPr sz="1800"/>
+            </a:pPr>
+            <a:r>
+              <a:rPr lang="de-AT" sz="2200" dirty="0" smtClean="0"/>
+              <a:t>73,74 Erfolgsmodelle Passat, Golf</a:t>
+            </a:r>
+          </a:p>
+          <a:p>
+            <a:pPr lvl="0">
+              <a:defRPr sz="1800"/>
+            </a:pPr>
+            <a:endParaRPr sz="2200" dirty="0"/>
           </a:p>
         </p:txBody>
       </p:sp>
     </p:spTree>
     <p:extLst>
       <p:ext uri="{BB962C8B-B14F-4D97-AF65-F5344CB8AC3E}">
-        <p14:creationId xmlns:p14="http://schemas.microsoft.com/office/powerpoint/2010/main" val="2121702000"/>
+        <p14:creationId xmlns:p14="http://schemas.microsoft.com/office/powerpoint/2010/main" val="1979351376"/>
       </p:ext>
     </p:extLst>
   </p:cSld>
@@ -3069,14 +3231,67 @@
             <a:pPr lvl="0">
               <a:defRPr sz="1800"/>
             </a:pPr>
-            <a:endParaRPr lang="de-AT" sz="2200" dirty="0" smtClean="0"/>
+            <a:r>
+              <a:rPr lang="de-AT" sz="2200" dirty="0" smtClean="0"/>
+              <a:t>Nach dem Krieg werden in Wolfsburg wieder Autos hergestellt, nämlich der Käfer</a:t>
+            </a:r>
+          </a:p>
+          <a:p>
+            <a:pPr lvl="0">
+              <a:defRPr sz="1800"/>
+            </a:pPr>
+            <a:r>
+              <a:rPr lang="de-AT" sz="2200" dirty="0" smtClean="0"/>
+              <a:t>in nur 10 Jahren seit Kriegsende schafft es VW eine Million Käfer zu produzieren</a:t>
+            </a:r>
+          </a:p>
+          <a:p>
+            <a:pPr lvl="0">
+              <a:defRPr sz="1800"/>
+            </a:pPr>
+            <a:r>
+              <a:rPr lang="de-AT" sz="2200" dirty="0" smtClean="0"/>
+              <a:t>1960 wird VW von einer GmbH zu einer Aktiengesellschaft</a:t>
+            </a:r>
+          </a:p>
+          <a:p>
+            <a:pPr lvl="0">
+              <a:defRPr sz="1800"/>
+            </a:pPr>
+            <a:r>
+              <a:rPr lang="de-AT" sz="2200" dirty="0" smtClean="0"/>
+              <a:t>1969 durch </a:t>
+            </a:r>
+            <a:r>
+              <a:rPr lang="de-AT" sz="2200" dirty="0" err="1" smtClean="0"/>
+              <a:t>erwerb</a:t>
+            </a:r>
+            <a:r>
+              <a:rPr lang="de-AT" sz="2200" dirty="0" smtClean="0"/>
+              <a:t> der Auto Union bekommt VW seine erste weitere Marke - Audi</a:t>
+            </a:r>
+          </a:p>
+          <a:p>
+            <a:pPr lvl="0">
+              <a:defRPr sz="1800"/>
+            </a:pPr>
+            <a:r>
+              <a:rPr lang="de-AT" sz="2200" dirty="0" smtClean="0"/>
+              <a:t>73,74 Erfolgsmodelle Passat, Golf</a:t>
+            </a:r>
+          </a:p>
+          <a:p>
+            <a:pPr lvl="0">
+              <a:defRPr sz="1800"/>
+            </a:pPr>
+            <a:endParaRPr sz="2200" dirty="0"/>
           </a:p>
         </p:txBody>
       </p:sp>
     </p:spTree>
     <p:extLst>
       <p:ext uri="{BB962C8B-B14F-4D97-AF65-F5344CB8AC3E}">
-        <p14:creationId xmlns:p14="http://schemas.microsoft.com/office/powerpoint/2010/main" val="3085683135"/>
+        <p14:creationId xmlns:p14="http://schemas.microsoft.com/office/powerpoint/2010/main" val="2600340274"/>
       </p:ext>
     </p:extLst>
   </p:cSld>
@@ -4239,7 +4454,7 @@
           </a:ln>
           <a:extLst>
             <a:ext uri="{C572A759-6A51-4108-AA02-DFA0A04FC94B}">
-              <ma14:wrappingTextBoxFlag xmlns:ma14="http://schemas.microsoft.com/office/mac/drawingml/2011/main" xmlns="" val="1"/>
+              <ma14:wrappingTextBoxFlag xmlns="" xmlns:ma14="http://schemas.microsoft.com/office/mac/drawingml/2011/main" val="1"/>
             </a:ext>
           </a:extLst>
         </p:spPr>
@@ -4282,7 +4497,7 @@
           </a:ln>
           <a:extLst>
             <a:ext uri="{C572A759-6A51-4108-AA02-DFA0A04FC94B}">
-              <ma14:wrappingTextBoxFlag xmlns:ma14="http://schemas.microsoft.com/office/mac/drawingml/2011/main" xmlns="" val="1"/>
+              <ma14:wrappingTextBoxFlag xmlns="" xmlns:ma14="http://schemas.microsoft.com/office/mac/drawingml/2011/main" val="1"/>
             </a:ext>
           </a:extLst>
         </p:spPr>
@@ -4801,12 +5016,8 @@
               <a:defRPr sz="1800"/>
             </a:pPr>
             <a:r>
-              <a:rPr lang="de-AT" sz="6000" dirty="0"/>
-              <a:t>Volkswagen </a:t>
-            </a:r>
-            <a:r>
-              <a:rPr lang="de-AT" sz="6000" dirty="0" err="1"/>
-              <a:t>Logistics</a:t>
+              <a:rPr lang="de-AT" sz="6000" dirty="0" smtClean="0"/>
+              <a:t>Unternehmensstruktur</a:t>
             </a:r>
             <a:endParaRPr sz="6000" dirty="0">
               <a:solidFill>
@@ -4841,72 +5052,110 @@
           <a:p>
             <a:pPr>
               <a:spcBef>
-                <a:spcPts val="1800"/>
+                <a:spcPts val="600"/>
               </a:spcBef>
             </a:pPr>
             <a:r>
-              <a:rPr lang="de-AT" dirty="0"/>
-              <a:t>130 Märkte</a:t>
+              <a:rPr lang="de-AT" sz="3000" dirty="0"/>
+              <a:t>Volkswagen AG – Muttergesellschaft des Volkswagen </a:t>
+            </a:r>
+            <a:r>
+              <a:rPr lang="de-AT" sz="3000" dirty="0" smtClean="0"/>
+              <a:t>Konzerns</a:t>
             </a:r>
           </a:p>
           <a:p>
             <a:pPr>
               <a:spcBef>
-                <a:spcPts val="1800"/>
+                <a:spcPts val="600"/>
               </a:spcBef>
             </a:pPr>
-            <a:r>
-              <a:rPr lang="de-AT" dirty="0"/>
-              <a:t>600 Mitarbeiter</a:t>
-            </a:r>
+            <a:endParaRPr lang="de-AT" sz="3000" dirty="0"/>
           </a:p>
           <a:p>
             <a:pPr>
               <a:spcBef>
-                <a:spcPts val="1800"/>
+                <a:spcPts val="600"/>
               </a:spcBef>
             </a:pPr>
             <a:r>
-              <a:rPr lang="de-AT" dirty="0"/>
-              <a:t>43 Milliarden Teile werden jährlich transportiert</a:t>
-            </a:r>
+              <a:rPr lang="de-AT" sz="3000" dirty="0"/>
+              <a:t>Konzernleitung:</a:t>
+            </a:r>
+          </a:p>
+          <a:p>
+            <a:pPr lvl="1">
+              <a:spcBef>
+                <a:spcPts val="600"/>
+              </a:spcBef>
+            </a:pPr>
+            <a:r>
+              <a:rPr lang="de-AT" sz="3000" dirty="0"/>
+              <a:t>Besteht aus Mitgliedern des Vorstands und Top-Managern</a:t>
+            </a:r>
+          </a:p>
+          <a:p>
+            <a:pPr lvl="1">
+              <a:spcBef>
+                <a:spcPts val="600"/>
+              </a:spcBef>
+            </a:pPr>
+            <a:r>
+              <a:rPr lang="de-AT" sz="3000" dirty="0"/>
+              <a:t>Sorgt dafür das Konzerninteressen bei Entscheidungen beachtet werden</a:t>
+            </a:r>
+          </a:p>
+          <a:p>
+            <a:pPr marL="457200" lvl="1" indent="0">
+              <a:spcBef>
+                <a:spcPts val="600"/>
+              </a:spcBef>
+              <a:buNone/>
+            </a:pPr>
+            <a:endParaRPr lang="de-AT" sz="3000" dirty="0"/>
           </a:p>
           <a:p>
             <a:pPr>
               <a:spcBef>
-                <a:spcPts val="1800"/>
+                <a:spcPts val="600"/>
               </a:spcBef>
             </a:pPr>
-            <a:endParaRPr lang="de-AT" dirty="0"/>
-          </a:p>
-          <a:p>
-            <a:pPr>
-              <a:spcBef>
-                <a:spcPts val="1800"/>
-              </a:spcBef>
-            </a:pPr>
-            <a:r>
-              <a:rPr lang="de-AT" dirty="0"/>
-              <a:t>Innovation und modernste Technologien</a:t>
+            <a:r>
+              <a:rPr lang="de-AT" sz="3000" dirty="0"/>
+              <a:t>Marken</a:t>
             </a:r>
           </a:p>
           <a:p>
             <a:pPr lvl="1">
               <a:spcBef>
-                <a:spcPts val="1800"/>
+                <a:spcPts val="600"/>
               </a:spcBef>
             </a:pPr>
             <a:r>
-              <a:rPr lang="de-AT" dirty="0"/>
-              <a:t>Z.B.: Lasergesteuerte, fahrerlose Transportsysteme</a:t>
-            </a:r>
-          </a:p>
-          <a:p>
-            <a:pPr marL="0" indent="0">
+              <a:rPr lang="de-AT" sz="3000" dirty="0"/>
+              <a:t>Agieren nahezu unabhängig</a:t>
+            </a:r>
+          </a:p>
+          <a:p>
+            <a:pPr lvl="1">
               <a:spcBef>
-                <a:spcPts val="1800"/>
+                <a:spcPts val="600"/>
               </a:spcBef>
-              <a:buNone/>
+            </a:pPr>
+            <a:r>
+              <a:rPr lang="de-AT" sz="3000" dirty="0"/>
+              <a:t>Interessen des Konzerns werden beachtet</a:t>
+            </a:r>
+          </a:p>
+          <a:p>
+            <a:pPr lvl="0">
+              <a:lnSpc>
+                <a:spcPct val="250000"/>
+              </a:lnSpc>
+              <a:spcBef>
+                <a:spcPts val="1200"/>
+              </a:spcBef>
+              <a:defRPr sz="1800"/>
             </a:pPr>
             <a:endParaRPr lang="de-AT" sz="3200" dirty="0"/>
           </a:p>
@@ -4915,7 +5164,7 @@
     </p:spTree>
     <p:extLst>
       <p:ext uri="{BB962C8B-B14F-4D97-AF65-F5344CB8AC3E}">
-        <p14:creationId xmlns:p14="http://schemas.microsoft.com/office/powerpoint/2010/main" val="3678149512"/>
+        <p14:creationId xmlns:p14="http://schemas.microsoft.com/office/powerpoint/2010/main" val="2223607590"/>
       </p:ext>
     </p:extLst>
   </p:cSld>
@@ -4980,7 +5229,7 @@
             </a:pPr>
             <a:r>
               <a:rPr lang="de-AT" sz="6000" dirty="0" smtClean="0"/>
-              <a:t>Finanzen</a:t>
+              <a:t>Vorstand</a:t>
             </a:r>
             <a:endParaRPr sz="6000" dirty="0">
               <a:solidFill>
@@ -5013,39 +5262,48 @@
           </a:bodyPr>
           <a:lstStyle/>
           <a:p>
-            <a:pPr lvl="0">
-              <a:defRPr sz="1800"/>
-            </a:pPr>
-            <a:r>
-              <a:rPr lang="de-AT" sz="3200" dirty="0" smtClean="0"/>
-              <a:t>Umsatzerlös:  65.587 Millionen Euro</a:t>
+            <a:r>
+              <a:rPr lang="de-AT" sz="3200" dirty="0"/>
+              <a:t>Besteht aus 9 Vorstands-Mitgliedern</a:t>
+            </a:r>
+          </a:p>
+          <a:p>
+            <a:r>
+              <a:rPr lang="de-AT" sz="3200" dirty="0"/>
+              <a:t>Vorsitzender des Vorstands: Prof. Dr. Dr. h. c. </a:t>
+            </a:r>
+            <a:r>
+              <a:rPr lang="de-AT" sz="3200" dirty="0" err="1"/>
+              <a:t>mult</a:t>
+            </a:r>
+            <a:r>
+              <a:rPr lang="de-AT" sz="3200" dirty="0"/>
+              <a:t>. Martin Winterkorn</a:t>
+            </a:r>
+          </a:p>
+          <a:p>
+            <a:r>
+              <a:rPr lang="de-AT" sz="3200" dirty="0"/>
+              <a:t>Konzernweite Entscheidungen</a:t>
+            </a:r>
+          </a:p>
+          <a:p>
+            <a:r>
+              <a:rPr lang="de-AT" sz="3200" dirty="0"/>
+              <a:t>Zuteilung nach </a:t>
+            </a:r>
+            <a:r>
+              <a:rPr lang="de-AT" sz="3200" dirty="0" err="1" smtClean="0"/>
+              <a:t>Geschäftbereich</a:t>
             </a:r>
             <a:endParaRPr lang="de-AT" sz="3200" dirty="0"/>
-          </a:p>
-          <a:p>
-            <a:pPr lvl="0">
-              <a:defRPr sz="1800"/>
-            </a:pPr>
-            <a:r>
-              <a:rPr lang="de-AT" sz="3200" dirty="0"/>
-              <a:t>Rückgang von 226 Millionen </a:t>
-            </a:r>
-          </a:p>
-          <a:p>
-            <a:pPr lvl="0">
-              <a:defRPr sz="1800"/>
-            </a:pPr>
-            <a:r>
-              <a:rPr lang="de-AT" sz="3200" dirty="0"/>
-              <a:t>Gewinnrückgang von 3 Milliarden Euro</a:t>
-            </a:r>
           </a:p>
         </p:txBody>
       </p:sp>
     </p:spTree>
     <p:extLst>
       <p:ext uri="{BB962C8B-B14F-4D97-AF65-F5344CB8AC3E}">
-        <p14:creationId xmlns:p14="http://schemas.microsoft.com/office/powerpoint/2010/main" val="535220097"/>
+        <p14:creationId xmlns:p14="http://schemas.microsoft.com/office/powerpoint/2010/main" val="1947979431"/>
       </p:ext>
     </p:extLst>
   </p:cSld>
@@ -5110,7 +5368,7 @@
             </a:pPr>
             <a:r>
               <a:rPr lang="de-AT" sz="6000" dirty="0" smtClean="0"/>
-              <a:t>Aktien</a:t>
+              <a:t>Marken und Hierarchie</a:t>
             </a:r>
             <a:endParaRPr sz="6000" dirty="0">
               <a:solidFill>
@@ -5143,73 +5401,21 @@
           </a:bodyPr>
           <a:lstStyle/>
           <a:p>
-            <a:pPr lvl="0">
-              <a:defRPr sz="1800"/>
+            <a:pPr marL="0" indent="0">
+              <a:buNone/>
             </a:pPr>
             <a:r>
               <a:rPr lang="de-AT" sz="3200" dirty="0" smtClean="0"/>
-              <a:t>Stamm und Vorzugsaktien</a:t>
-            </a:r>
-          </a:p>
-          <a:p>
-            <a:pPr lvl="0">
-              <a:defRPr sz="1800"/>
-            </a:pPr>
-            <a:r>
-              <a:rPr lang="de-AT" sz="3200" dirty="0"/>
-              <a:t>totale Marktkapital: bei 114,71 </a:t>
-            </a:r>
-            <a:r>
-              <a:rPr lang="de-AT" sz="3200" dirty="0" smtClean="0"/>
-              <a:t>Mrd. Euro</a:t>
-            </a:r>
-          </a:p>
-          <a:p>
-            <a:pPr lvl="0">
-              <a:defRPr sz="1800"/>
-            </a:pPr>
-            <a:r>
-              <a:rPr lang="de-AT" sz="3200" dirty="0" smtClean="0"/>
-              <a:t>Stand der Aktie: 250 Euro </a:t>
+              <a:t>Tabelle…</a:t>
             </a:r>
             <a:endParaRPr lang="de-AT" sz="3200" dirty="0"/>
           </a:p>
         </p:txBody>
       </p:sp>
-      <p:pic>
-        <p:nvPicPr>
-          <p:cNvPr id="2" name="Picture 1"/>
-          <p:cNvPicPr>
-            <a:picLocks noChangeAspect="1"/>
-          </p:cNvPicPr>
-          <p:nvPr/>
-        </p:nvPicPr>
-        <p:blipFill>
-          <a:blip r:embed="rId3">
-            <a:extLst>
-              <a:ext uri="{28A0092B-C50C-407E-A947-70E740481C1C}">
-                <a14:useLocalDpi xmlns:a14="http://schemas.microsoft.com/office/drawing/2010/main" val="0"/>
-              </a:ext>
-            </a:extLst>
-          </a:blip>
-          <a:stretch>
-            <a:fillRect/>
-          </a:stretch>
-        </p:blipFill>
-        <p:spPr>
-          <a:xfrm>
-            <a:off x="5887095" y="1979768"/>
-            <a:ext cx="6753332" cy="2398268"/>
-          </a:xfrm>
-          <a:prstGeom prst="rect">
-            <a:avLst/>
-          </a:prstGeom>
-        </p:spPr>
-      </p:pic>
     </p:spTree>
     <p:extLst>
       <p:ext uri="{BB962C8B-B14F-4D97-AF65-F5344CB8AC3E}">
-        <p14:creationId xmlns:p14="http://schemas.microsoft.com/office/powerpoint/2010/main" val="2896883788"/>
+        <p14:creationId xmlns:p14="http://schemas.microsoft.com/office/powerpoint/2010/main" val="143233847"/>
       </p:ext>
     </p:extLst>
   </p:cSld>
@@ -5274,7 +5480,7 @@
             </a:pPr>
             <a:r>
               <a:rPr lang="de-AT" sz="6000" dirty="0" smtClean="0"/>
-              <a:t>Aktionärsstruktur</a:t>
+              <a:t>Logistik</a:t>
             </a:r>
             <a:endParaRPr sz="6000" dirty="0">
               <a:solidFill>
@@ -5288,182 +5494,85 @@
       </p:sp>
       <p:sp>
         <p:nvSpPr>
-          <p:cNvPr id="3" name="Text Placeholder 2"/>
-          <p:cNvSpPr>
-            <a:spLocks noGrp="1" noChangeArrowheads="1"/>
+          <p:cNvPr id="36" name="Shape 36"/>
+          <p:cNvSpPr>
+            <a:spLocks noGrp="1"/>
           </p:cNvSpPr>
           <p:nvPr>
             <p:ph type="body" idx="1"/>
           </p:nvPr>
         </p:nvSpPr>
-        <p:spPr bwMode="auto">
-          <a:xfrm>
-            <a:off x="869373" y="2822230"/>
-            <a:ext cx="8999258" cy="1969770"/>
-          </a:xfrm>
-          <a:prstGeom prst="rect">
-            <a:avLst/>
-          </a:prstGeom>
-          <a:noFill/>
-          <a:ln>
-            <a:noFill/>
-          </a:ln>
-          <a:effectLst/>
-          <a:extLst>
-            <a:ext uri="{909E8E84-426E-40DD-AFC4-6F175D3DCCD1}">
-              <a14:hiddenFill xmlns:a14="http://schemas.microsoft.com/office/drawing/2010/main">
-                <a:solidFill>
-                  <a:schemeClr val="accent1"/>
-                </a:solidFill>
-              </a14:hiddenFill>
-            </a:ext>
-            <a:ext uri="{91240B29-F687-4F45-9708-019B960494DF}">
-              <a14:hiddenLine xmlns:a14="http://schemas.microsoft.com/office/drawing/2010/main" w="9525">
-                <a:solidFill>
-                  <a:schemeClr val="tx1"/>
-                </a:solidFill>
-                <a:miter lim="800000"/>
-                <a:headEnd/>
-                <a:tailEnd/>
-              </a14:hiddenLine>
-            </a:ext>
-            <a:ext uri="{AF507438-7753-43E0-B8FC-AC1667EBCBE1}">
-              <a14:hiddenEffects xmlns:a14="http://schemas.microsoft.com/office/drawing/2010/main">
-                <a:effectLst>
-                  <a:outerShdw dist="35921" dir="2700000" algn="ctr" rotWithShape="0">
-                    <a:schemeClr val="bg2"/>
-                  </a:outerShdw>
-                </a:effectLst>
-              </a14:hiddenEffects>
-            </a:ext>
-          </a:extLst>
-        </p:spPr>
-        <p:txBody>
-          <a:bodyPr vert="horz" wrap="none" lIns="0" tIns="0" rIns="0" bIns="0" numCol="1" anchor="ctr" anchorCtr="0" compatLnSpc="1">
-            <a:prstTxWarp prst="textNoShape">
-              <a:avLst/>
-            </a:prstTxWarp>
-            <a:spAutoFit/>
+        <p:spPr>
+          <a:prstGeom prst="rect">
+            <a:avLst/>
+          </a:prstGeom>
+        </p:spPr>
+        <p:txBody>
+          <a:bodyPr>
+            <a:normAutofit/>
           </a:bodyPr>
           <a:lstStyle/>
           <a:p>
-            <a:pPr marL="0" marR="0" lvl="0" indent="0" algn="l" defTabSz="914400" rtl="0" eaLnBrk="0" fontAlgn="base" latinLnBrk="0" hangingPunct="0">
-              <a:lnSpc>
-                <a:spcPct val="100000"/>
-              </a:lnSpc>
+            <a:pPr>
               <a:spcBef>
-                <a:spcPct val="0"/>
+                <a:spcPts val="1800"/>
               </a:spcBef>
-              <a:spcAft>
-                <a:spcPct val="0"/>
-              </a:spcAft>
-              <a:buClrTx/>
-              <a:buSzTx/>
-              <a:buFontTx/>
-              <a:buNone/>
-              <a:tabLst/>
-            </a:pPr>
-            <a:r>
-              <a:rPr lang="de-DE" altLang="de-DE" sz="3200" dirty="0" smtClean="0"/>
-              <a:t>50,73% </a:t>
-            </a:r>
-            <a:r>
-              <a:rPr lang="de-DE" altLang="de-DE" sz="3200" dirty="0"/>
-              <a:t>Porsche Automobil Holding SE, </a:t>
-            </a:r>
-            <a:r>
-              <a:rPr lang="de-DE" altLang="de-DE" sz="3200" dirty="0" smtClean="0"/>
-              <a:t>Stuttgart</a:t>
-            </a:r>
-          </a:p>
-          <a:p>
-            <a:pPr marL="0" marR="0" lvl="0" indent="0" algn="l" defTabSz="914400" rtl="0" eaLnBrk="0" fontAlgn="base" latinLnBrk="0" hangingPunct="0">
-              <a:lnSpc>
-                <a:spcPct val="100000"/>
-              </a:lnSpc>
+            </a:pPr>
+            <a:r>
+              <a:rPr lang="de-AT" sz="3200" dirty="0"/>
+              <a:t>Sitz in Wolfsburg</a:t>
+            </a:r>
+          </a:p>
+          <a:p>
+            <a:pPr>
               <a:spcBef>
-                <a:spcPct val="0"/>
+                <a:spcPts val="1800"/>
               </a:spcBef>
-              <a:spcAft>
-                <a:spcPct val="0"/>
-              </a:spcAft>
-              <a:buClrTx/>
-              <a:buSzTx/>
-              <a:buFontTx/>
-              <a:buNone/>
-              <a:tabLst/>
-            </a:pPr>
-            <a:r>
-              <a:rPr lang="de-DE" altLang="de-DE" sz="3200" dirty="0" smtClean="0"/>
-              <a:t>20,00% </a:t>
-            </a:r>
-            <a:r>
-              <a:rPr lang="de-DE" altLang="de-DE" sz="3200" dirty="0"/>
-              <a:t>Land Niedersachsen, </a:t>
-            </a:r>
-            <a:r>
-              <a:rPr lang="de-DE" altLang="de-DE" sz="3200" dirty="0" smtClean="0"/>
-              <a:t>Hannover</a:t>
-            </a:r>
-          </a:p>
-          <a:p>
-            <a:pPr marL="0" marR="0" lvl="0" indent="0" algn="l" defTabSz="914400" rtl="0" eaLnBrk="0" fontAlgn="base" latinLnBrk="0" hangingPunct="0">
-              <a:lnSpc>
-                <a:spcPct val="100000"/>
-              </a:lnSpc>
+            </a:pPr>
+            <a:r>
+              <a:rPr lang="de-AT" sz="3200" dirty="0"/>
+              <a:t>Nicht nur integrierte Logistik</a:t>
+            </a:r>
+          </a:p>
+          <a:p>
+            <a:pPr>
               <a:spcBef>
-                <a:spcPct val="0"/>
+                <a:spcPts val="1800"/>
               </a:spcBef>
-              <a:spcAft>
-                <a:spcPct val="0"/>
-              </a:spcAft>
-              <a:buClrTx/>
-              <a:buSzTx/>
-              <a:buFontTx/>
-              <a:buNone/>
-              <a:tabLst/>
-            </a:pPr>
-            <a:r>
-              <a:rPr lang="de-DE" altLang="de-DE" sz="3200" dirty="0" smtClean="0"/>
-              <a:t>17,00% </a:t>
-            </a:r>
-            <a:r>
-              <a:rPr lang="de-DE" altLang="de-DE" sz="3200" dirty="0" err="1"/>
-              <a:t>Qatar</a:t>
-            </a:r>
-            <a:r>
-              <a:rPr lang="de-DE" altLang="de-DE" sz="3200" dirty="0"/>
-              <a:t> Holding </a:t>
-            </a:r>
-            <a:r>
-              <a:rPr lang="de-DE" altLang="de-DE" sz="3200" dirty="0" smtClean="0"/>
-              <a:t>LLC</a:t>
-            </a:r>
-          </a:p>
-          <a:p>
-            <a:pPr marL="0" marR="0" lvl="0" indent="0" algn="l" defTabSz="914400" rtl="0" eaLnBrk="0" fontAlgn="base" latinLnBrk="0" hangingPunct="0">
-              <a:lnSpc>
-                <a:spcPct val="100000"/>
-              </a:lnSpc>
+            </a:pPr>
+            <a:r>
+              <a:rPr lang="de-AT" sz="3200" dirty="0"/>
+              <a:t>Auch externe Aufträge</a:t>
+            </a:r>
+          </a:p>
+          <a:p>
+            <a:pPr>
               <a:spcBef>
-                <a:spcPct val="0"/>
+                <a:spcPts val="1800"/>
               </a:spcBef>
-              <a:spcAft>
-                <a:spcPct val="0"/>
-              </a:spcAft>
-              <a:buClrTx/>
-              <a:buSzTx/>
-              <a:buFontTx/>
-              <a:buNone/>
-              <a:tabLst/>
-            </a:pPr>
-            <a:r>
-              <a:rPr lang="de-DE" altLang="de-DE" sz="3200" dirty="0" smtClean="0"/>
-              <a:t>12,30% </a:t>
-            </a:r>
-            <a:r>
-              <a:rPr lang="de-DE" altLang="de-DE" sz="3200" dirty="0"/>
-              <a:t>Weitere</a:t>
+            </a:pPr>
+            <a:r>
+              <a:rPr lang="de-AT" sz="3200" dirty="0"/>
+              <a:t>Betreut gesamte Supply-Chain</a:t>
+            </a:r>
+          </a:p>
+          <a:p>
+            <a:pPr>
+              <a:spcBef>
+                <a:spcPts val="1800"/>
+              </a:spcBef>
+            </a:pPr>
+            <a:endParaRPr lang="de-AT" sz="3200" dirty="0"/>
+          </a:p>
+          <a:p>
+            <a:pPr>
+              <a:spcBef>
+                <a:spcPts val="1800"/>
+              </a:spcBef>
+            </a:pPr>
+            <a:r>
+              <a:rPr lang="de-AT" sz="3200" dirty="0"/>
+              <a:t>Zusätzlich auch: Lagerung, Transport, Verpackung und Entsorgung</a:t>
             </a:r>
           </a:p>
         </p:txBody>
@@ -5471,7 +5580,7 @@
     </p:spTree>
     <p:extLst>
       <p:ext uri="{BB962C8B-B14F-4D97-AF65-F5344CB8AC3E}">
-        <p14:creationId xmlns:p14="http://schemas.microsoft.com/office/powerpoint/2010/main" val="539779500"/>
+        <p14:creationId xmlns:p14="http://schemas.microsoft.com/office/powerpoint/2010/main" val="3024887283"/>
       </p:ext>
     </p:extLst>
   </p:cSld>
@@ -5535,8 +5644,12 @@
               <a:defRPr sz="1800"/>
             </a:pPr>
             <a:r>
-              <a:rPr lang="de-AT" sz="6000" dirty="0" smtClean="0"/>
-              <a:t>Markt</a:t>
+              <a:rPr lang="de-AT" sz="6000" dirty="0"/>
+              <a:t>Volkswagen </a:t>
+            </a:r>
+            <a:r>
+              <a:rPr lang="de-AT" sz="6000" dirty="0" err="1"/>
+              <a:t>Logistics</a:t>
             </a:r>
             <a:endParaRPr sz="6000" dirty="0">
               <a:solidFill>
@@ -5550,7 +5663,7 @@
       </p:sp>
       <p:sp>
         <p:nvSpPr>
-          <p:cNvPr id="2" name="Text Placeholder 1"/>
+          <p:cNvPr id="36" name="Shape 36"/>
           <p:cNvSpPr>
             <a:spLocks noGrp="1"/>
           </p:cNvSpPr>
@@ -5558,49 +5671,94 @@
             <p:ph type="body" idx="1"/>
           </p:nvPr>
         </p:nvSpPr>
-        <p:spPr/>
-        <p:txBody>
-          <a:bodyPr/>
-          <a:lstStyle/>
-          <a:p>
-            <a:endParaRPr lang="de-AT"/>
-          </a:p>
-        </p:txBody>
-      </p:sp>
-      <p:pic>
-        <p:nvPicPr>
-          <p:cNvPr id="3" name="Picture 2"/>
-          <p:cNvPicPr>
-            <a:picLocks noChangeAspect="1"/>
-          </p:cNvPicPr>
-          <p:nvPr/>
-        </p:nvPicPr>
-        <p:blipFill>
-          <a:blip r:embed="rId3">
-            <a:extLst>
-              <a:ext uri="{28A0092B-C50C-407E-A947-70E740481C1C}">
-                <a14:useLocalDpi xmlns:a14="http://schemas.microsoft.com/office/drawing/2010/main" val="0"/>
-              </a:ext>
-            </a:extLst>
-          </a:blip>
-          <a:stretch>
-            <a:fillRect/>
-          </a:stretch>
-        </p:blipFill>
-        <p:spPr>
-          <a:xfrm>
-            <a:off x="4071895" y="2186132"/>
-            <a:ext cx="6353260" cy="7121236"/>
-          </a:xfrm>
-          <a:prstGeom prst="rect">
-            <a:avLst/>
-          </a:prstGeom>
-        </p:spPr>
-      </p:pic>
+        <p:spPr>
+          <a:prstGeom prst="rect">
+            <a:avLst/>
+          </a:prstGeom>
+        </p:spPr>
+        <p:txBody>
+          <a:bodyPr>
+            <a:normAutofit/>
+          </a:bodyPr>
+          <a:lstStyle/>
+          <a:p>
+            <a:pPr>
+              <a:spcBef>
+                <a:spcPts val="1800"/>
+              </a:spcBef>
+            </a:pPr>
+            <a:r>
+              <a:rPr lang="de-AT" dirty="0"/>
+              <a:t>130 Märkte</a:t>
+            </a:r>
+          </a:p>
+          <a:p>
+            <a:pPr>
+              <a:spcBef>
+                <a:spcPts val="1800"/>
+              </a:spcBef>
+            </a:pPr>
+            <a:r>
+              <a:rPr lang="de-AT" dirty="0"/>
+              <a:t>600 Mitarbeiter</a:t>
+            </a:r>
+          </a:p>
+          <a:p>
+            <a:pPr>
+              <a:spcBef>
+                <a:spcPts val="1800"/>
+              </a:spcBef>
+            </a:pPr>
+            <a:r>
+              <a:rPr lang="de-AT" dirty="0"/>
+              <a:t>43 Milliarden Teile werden jährlich transportiert</a:t>
+            </a:r>
+          </a:p>
+          <a:p>
+            <a:pPr>
+              <a:spcBef>
+                <a:spcPts val="1800"/>
+              </a:spcBef>
+            </a:pPr>
+            <a:endParaRPr lang="de-AT" dirty="0"/>
+          </a:p>
+          <a:p>
+            <a:pPr>
+              <a:spcBef>
+                <a:spcPts val="1800"/>
+              </a:spcBef>
+            </a:pPr>
+            <a:r>
+              <a:rPr lang="de-AT" dirty="0"/>
+              <a:t>Innovation und modernste Technologien</a:t>
+            </a:r>
+          </a:p>
+          <a:p>
+            <a:pPr lvl="1">
+              <a:spcBef>
+                <a:spcPts val="1800"/>
+              </a:spcBef>
+            </a:pPr>
+            <a:r>
+              <a:rPr lang="de-AT" dirty="0"/>
+              <a:t>Z.B.: Lasergesteuerte, fahrerlose Transportsysteme</a:t>
+            </a:r>
+          </a:p>
+          <a:p>
+            <a:pPr marL="0" indent="0">
+              <a:spcBef>
+                <a:spcPts val="1800"/>
+              </a:spcBef>
+              <a:buNone/>
+            </a:pPr>
+            <a:endParaRPr lang="de-AT" sz="3200" dirty="0"/>
+          </a:p>
+        </p:txBody>
+      </p:sp>
     </p:spTree>
     <p:extLst>
       <p:ext uri="{BB962C8B-B14F-4D97-AF65-F5344CB8AC3E}">
-        <p14:creationId xmlns:p14="http://schemas.microsoft.com/office/powerpoint/2010/main" val="3046062018"/>
+        <p14:creationId xmlns:p14="http://schemas.microsoft.com/office/powerpoint/2010/main" val="3678149512"/>
       </p:ext>
     </p:extLst>
   </p:cSld>
@@ -5692,7 +5850,7 @@
           <a:bodyPr/>
           <a:lstStyle/>
           <a:p>
-            <a:endParaRPr lang="de-AT" dirty="0"/>
+            <a:endParaRPr lang="de-AT"/>
           </a:p>
         </p:txBody>
       </p:sp>
@@ -5718,8 +5876,8 @@
         </p:blipFill>
         <p:spPr>
           <a:xfrm>
-            <a:off x="3758679" y="2310245"/>
-            <a:ext cx="7035109" cy="6873009"/>
+            <a:off x="952500" y="1768764"/>
+            <a:ext cx="7108658" cy="7967946"/>
           </a:xfrm>
           <a:prstGeom prst="rect">
             <a:avLst/>
@@ -5729,7 +5887,7 @@
     </p:spTree>
     <p:extLst>
       <p:ext uri="{BB962C8B-B14F-4D97-AF65-F5344CB8AC3E}">
-        <p14:creationId xmlns:p14="http://schemas.microsoft.com/office/powerpoint/2010/main" val="3603581401"/>
+        <p14:creationId xmlns:p14="http://schemas.microsoft.com/office/powerpoint/2010/main" val="3046062018"/>
       </p:ext>
     </p:extLst>
   </p:cSld>
@@ -5821,7 +5979,7 @@
           <a:bodyPr/>
           <a:lstStyle/>
           <a:p>
-            <a:endParaRPr lang="de-AT"/>
+            <a:endParaRPr lang="de-AT" dirty="0"/>
           </a:p>
         </p:txBody>
       </p:sp>
@@ -5847,8 +6005,8 @@
         </p:blipFill>
         <p:spPr>
           <a:xfrm>
-            <a:off x="3762296" y="2131579"/>
-            <a:ext cx="5480208" cy="7230341"/>
+            <a:off x="952500" y="1990740"/>
+            <a:ext cx="7945947" cy="7762860"/>
           </a:xfrm>
           <a:prstGeom prst="rect">
             <a:avLst/>
@@ -5858,7 +6016,7 @@
     </p:spTree>
     <p:extLst>
       <p:ext uri="{BB962C8B-B14F-4D97-AF65-F5344CB8AC3E}">
-        <p14:creationId xmlns:p14="http://schemas.microsoft.com/office/powerpoint/2010/main" val="2217636273"/>
+        <p14:creationId xmlns:p14="http://schemas.microsoft.com/office/powerpoint/2010/main" val="3603581401"/>
       </p:ext>
     </p:extLst>
   </p:cSld>
@@ -5976,8 +6134,8 @@
         </p:blipFill>
         <p:spPr>
           <a:xfrm>
-            <a:off x="4216265" y="2168683"/>
-            <a:ext cx="6064519" cy="7156133"/>
+            <a:off x="1022191" y="1939074"/>
+            <a:ext cx="5922989" cy="7814526"/>
           </a:xfrm>
           <a:prstGeom prst="rect">
             <a:avLst/>
@@ -5987,7 +6145,7 @@
     </p:spTree>
     <p:extLst>
       <p:ext uri="{BB962C8B-B14F-4D97-AF65-F5344CB8AC3E}">
-        <p14:creationId xmlns:p14="http://schemas.microsoft.com/office/powerpoint/2010/main" val="1496055247"/>
+        <p14:creationId xmlns:p14="http://schemas.microsoft.com/office/powerpoint/2010/main" val="2217636273"/>
       </p:ext>
     </p:extLst>
   </p:cSld>
@@ -6052,7 +6210,7 @@
             </a:pPr>
             <a:r>
               <a:rPr lang="de-AT" sz="6000" dirty="0" smtClean="0"/>
-              <a:t>Ziele</a:t>
+              <a:t>Markt</a:t>
             </a:r>
             <a:endParaRPr sz="6000" dirty="0">
               <a:solidFill>
@@ -6066,7 +6224,7 @@
       </p:sp>
       <p:sp>
         <p:nvSpPr>
-          <p:cNvPr id="36" name="Shape 36"/>
+          <p:cNvPr id="2" name="Text Placeholder 1"/>
           <p:cNvSpPr>
             <a:spLocks noGrp="1"/>
           </p:cNvSpPr>
@@ -6074,85 +6232,49 @@
             <p:ph type="body" idx="1"/>
           </p:nvPr>
         </p:nvSpPr>
-        <p:spPr>
-          <a:prstGeom prst="rect">
-            <a:avLst/>
-          </a:prstGeom>
-        </p:spPr>
-        <p:txBody>
-          <a:bodyPr>
-            <a:noAutofit/>
-          </a:bodyPr>
-          <a:lstStyle/>
-          <a:p>
-            <a:pPr lvl="0">
-              <a:defRPr sz="1800"/>
-            </a:pPr>
-            <a:r>
-              <a:rPr lang="de-AT" sz="3200" dirty="0"/>
-              <a:t>Steigerung der Kundenzufriedenheit und Qualität </a:t>
-            </a:r>
-          </a:p>
-          <a:p>
-            <a:pPr lvl="0">
-              <a:defRPr sz="1800"/>
-            </a:pPr>
-            <a:r>
-              <a:rPr lang="de-AT" sz="3200" dirty="0"/>
-              <a:t>Absatz  auf 10 Mio. Fahrzeuge steigern</a:t>
-            </a:r>
-          </a:p>
-          <a:p>
-            <a:pPr lvl="0">
-              <a:defRPr sz="1800"/>
-            </a:pPr>
-            <a:r>
-              <a:rPr lang="de-AT" sz="3200" dirty="0"/>
-              <a:t>Steigerung der Umsatzrendite </a:t>
-            </a:r>
-          </a:p>
-          <a:p>
-            <a:pPr lvl="0">
-              <a:defRPr sz="1800"/>
-            </a:pPr>
-            <a:r>
-              <a:rPr lang="de-AT" sz="3200" dirty="0"/>
-              <a:t>Als Arbeitgeber besser profilieren </a:t>
-            </a:r>
-          </a:p>
-          <a:p>
-            <a:pPr lvl="0">
-              <a:defRPr sz="1800"/>
-            </a:pPr>
-            <a:r>
-              <a:rPr lang="de-AT" sz="3200" dirty="0"/>
-              <a:t>Neue Märkte: Asien und Amerika</a:t>
-            </a:r>
-          </a:p>
-          <a:p>
-            <a:pPr lvl="0">
-              <a:defRPr sz="1800"/>
-            </a:pPr>
-            <a:r>
-              <a:rPr lang="de-AT" sz="3200" dirty="0"/>
-              <a:t>Elektro und Hybrid Fahrzeuge</a:t>
-            </a:r>
-          </a:p>
-          <a:p>
-            <a:pPr lvl="0">
-              <a:defRPr sz="1800"/>
-            </a:pPr>
-            <a:r>
-              <a:rPr lang="de-AT" sz="3200" dirty="0"/>
-              <a:t>Nachhaltigkeit</a:t>
-            </a:r>
-          </a:p>
-        </p:txBody>
-      </p:sp>
+        <p:spPr/>
+        <p:txBody>
+          <a:bodyPr/>
+          <a:lstStyle/>
+          <a:p>
+            <a:endParaRPr lang="de-AT"/>
+          </a:p>
+        </p:txBody>
+      </p:sp>
+      <p:pic>
+        <p:nvPicPr>
+          <p:cNvPr id="3" name="Picture 2"/>
+          <p:cNvPicPr>
+            <a:picLocks noChangeAspect="1"/>
+          </p:cNvPicPr>
+          <p:nvPr/>
+        </p:nvPicPr>
+        <p:blipFill>
+          <a:blip r:embed="rId3">
+            <a:extLst>
+              <a:ext uri="{28A0092B-C50C-407E-A947-70E740481C1C}">
+                <a14:useLocalDpi xmlns:a14="http://schemas.microsoft.com/office/drawing/2010/main" val="0"/>
+              </a:ext>
+            </a:extLst>
+          </a:blip>
+          <a:stretch>
+            <a:fillRect/>
+          </a:stretch>
+        </p:blipFill>
+        <p:spPr>
+          <a:xfrm>
+            <a:off x="1184006" y="1903989"/>
+            <a:ext cx="6636520" cy="7831094"/>
+          </a:xfrm>
+          <a:prstGeom prst="rect">
+            <a:avLst/>
+          </a:prstGeom>
+        </p:spPr>
+      </p:pic>
     </p:spTree>
     <p:extLst>
       <p:ext uri="{BB962C8B-B14F-4D97-AF65-F5344CB8AC3E}">
-        <p14:creationId xmlns:p14="http://schemas.microsoft.com/office/powerpoint/2010/main" val="3717363788"/>
+        <p14:creationId xmlns:p14="http://schemas.microsoft.com/office/powerpoint/2010/main" val="1496055247"/>
       </p:ext>
     </p:extLst>
   </p:cSld>
@@ -6217,11 +6339,7 @@
             </a:pPr>
             <a:r>
               <a:rPr lang="de-AT" sz="6000" dirty="0" smtClean="0"/>
-              <a:t>ERP </a:t>
-            </a:r>
-            <a:r>
-              <a:rPr lang="de-AT" sz="6000" dirty="0" err="1" smtClean="0"/>
-              <a:t>Auswahlskriterien</a:t>
+              <a:t>Ziele</a:t>
             </a:r>
             <a:endParaRPr sz="6000" dirty="0">
               <a:solidFill>
@@ -6258,64 +6376,70 @@
               <a:defRPr sz="1800"/>
             </a:pPr>
             <a:r>
-              <a:rPr lang="de-AT" sz="3200" dirty="0" smtClean="0"/>
-              <a:t>Komplexität des Unternehmens</a:t>
-            </a:r>
-          </a:p>
-          <a:p>
-            <a:pPr lvl="0">
-              <a:defRPr sz="1800"/>
-            </a:pPr>
-            <a:r>
-              <a:rPr lang="de-AT" sz="3200" dirty="0" smtClean="0"/>
-              <a:t>Internationale Orientierung</a:t>
-            </a:r>
-          </a:p>
-          <a:p>
-            <a:pPr lvl="0">
-              <a:defRPr sz="1800"/>
-            </a:pPr>
-            <a:r>
-              <a:rPr lang="de-AT" sz="3200" dirty="0" smtClean="0"/>
-              <a:t>Kosten zweitrangig</a:t>
-            </a:r>
-          </a:p>
-          <a:p>
-            <a:pPr lvl="0">
-              <a:defRPr sz="1800"/>
-            </a:pPr>
-            <a:r>
-              <a:rPr lang="de-AT" sz="3200" dirty="0" smtClean="0"/>
-              <a:t>Unterstützung von Planung bis zu Ausführung</a:t>
-            </a:r>
-          </a:p>
-          <a:p>
-            <a:pPr lvl="0">
-              <a:defRPr sz="1800"/>
-            </a:pPr>
-            <a:r>
-              <a:rPr lang="de-AT" sz="3200" dirty="0" smtClean="0"/>
-              <a:t>Wenig Augenmerk auf Vertrieb, CRM und Wartung</a:t>
-            </a:r>
-          </a:p>
-          <a:p>
-            <a:pPr lvl="0">
-              <a:defRPr sz="1800"/>
-            </a:pPr>
-            <a:endParaRPr lang="de-AT" sz="3200" dirty="0" smtClean="0"/>
-          </a:p>
-          <a:p>
-            <a:pPr lvl="0">
-              <a:defRPr sz="1800"/>
-            </a:pPr>
-            <a:endParaRPr lang="de-AT" sz="3200" dirty="0"/>
+              <a:rPr lang="de-AT" sz="3200" dirty="0"/>
+              <a:t>Steigerung der Kundenzufriedenheit und Qualität </a:t>
+            </a:r>
+          </a:p>
+          <a:p>
+            <a:pPr lvl="0">
+              <a:defRPr sz="1800"/>
+            </a:pPr>
+            <a:r>
+              <a:rPr lang="de-AT" sz="3200" dirty="0"/>
+              <a:t>Absatz  auf 10 Mio. Fahrzeuge steigern</a:t>
+            </a:r>
+          </a:p>
+          <a:p>
+            <a:pPr lvl="0">
+              <a:defRPr sz="1800"/>
+            </a:pPr>
+            <a:r>
+              <a:rPr lang="de-AT" sz="3200" dirty="0"/>
+              <a:t>Steigerung der Umsatzrendite </a:t>
+            </a:r>
+          </a:p>
+          <a:p>
+            <a:pPr lvl="0">
+              <a:defRPr sz="1800"/>
+            </a:pPr>
+            <a:r>
+              <a:rPr lang="de-AT" sz="3200" dirty="0"/>
+              <a:t>Als Arbeitgeber besser profilieren </a:t>
+            </a:r>
+          </a:p>
+          <a:p>
+            <a:pPr lvl="0">
+              <a:defRPr sz="1800"/>
+            </a:pPr>
+            <a:r>
+              <a:rPr lang="de-AT" sz="3200" dirty="0"/>
+              <a:t>Neue Märkte: Asien und Amerika</a:t>
+            </a:r>
+          </a:p>
+          <a:p>
+            <a:pPr lvl="0">
+              <a:defRPr sz="1800"/>
+            </a:pPr>
+            <a:r>
+              <a:rPr lang="de-AT" sz="3200" dirty="0"/>
+              <a:t>Elektro und Hybrid Fahrzeuge</a:t>
+            </a:r>
+          </a:p>
+          <a:p>
+            <a:pPr lvl="0">
+              <a:defRPr sz="1800"/>
+            </a:pPr>
+            <a:r>
+              <a:rPr lang="de-AT" sz="3200" dirty="0"/>
+              <a:t>Nachhaltigkeit</a:t>
+            </a:r>
           </a:p>
         </p:txBody>
       </p:sp>
     </p:spTree>
     <p:extLst>
       <p:ext uri="{BB962C8B-B14F-4D97-AF65-F5344CB8AC3E}">
-        <p14:creationId xmlns:p14="http://schemas.microsoft.com/office/powerpoint/2010/main" val="3307975126"/>
+        <p14:creationId xmlns:p14="http://schemas.microsoft.com/office/powerpoint/2010/main" val="3717363788"/>
       </p:ext>
     </p:extLst>
   </p:cSld>
@@ -6522,7 +6646,11 @@
             </a:pPr>
             <a:r>
               <a:rPr lang="de-AT" sz="6000" dirty="0" smtClean="0"/>
-              <a:t>ERP Auswahl</a:t>
+              <a:t>ERP </a:t>
+            </a:r>
+            <a:r>
+              <a:rPr lang="de-AT" sz="6000" dirty="0" err="1" smtClean="0"/>
+              <a:t>Auswahlskriterien</a:t>
             </a:r>
             <a:endParaRPr sz="6000" dirty="0">
               <a:solidFill>
@@ -6536,7 +6664,7 @@
       </p:sp>
       <p:sp>
         <p:nvSpPr>
-          <p:cNvPr id="2" name="Text Placeholder 1"/>
+          <p:cNvPr id="36" name="Shape 36"/>
           <p:cNvSpPr>
             <a:spLocks noGrp="1"/>
           </p:cNvSpPr>
@@ -6544,49 +6672,117 @@
             <p:ph type="body" idx="1"/>
           </p:nvPr>
         </p:nvSpPr>
-        <p:spPr/>
-        <p:txBody>
-          <a:bodyPr/>
-          <a:lstStyle/>
-          <a:p>
-            <a:endParaRPr lang="de-AT"/>
-          </a:p>
-        </p:txBody>
-      </p:sp>
-      <p:pic>
-        <p:nvPicPr>
-          <p:cNvPr id="3" name="Picture 2"/>
-          <p:cNvPicPr>
-            <a:picLocks noChangeAspect="1"/>
-          </p:cNvPicPr>
-          <p:nvPr/>
-        </p:nvPicPr>
-        <p:blipFill>
-          <a:blip r:embed="rId3">
-            <a:extLst>
-              <a:ext uri="{28A0092B-C50C-407E-A947-70E740481C1C}">
-                <a14:useLocalDpi xmlns:a14="http://schemas.microsoft.com/office/drawing/2010/main" val="0"/>
-              </a:ext>
-            </a:extLst>
-          </a:blip>
-          <a:stretch>
-            <a:fillRect/>
-          </a:stretch>
-        </p:blipFill>
         <p:spPr>
           <a:xfrm>
-            <a:off x="2565347" y="2603500"/>
-            <a:ext cx="7874106" cy="6286500"/>
+            <a:off x="952500" y="2892258"/>
+            <a:ext cx="11099800" cy="6286500"/>
           </a:xfrm>
           <a:prstGeom prst="rect">
             <a:avLst/>
           </a:prstGeom>
         </p:spPr>
-      </p:pic>
+        <p:txBody>
+          <a:bodyPr>
+            <a:noAutofit/>
+          </a:bodyPr>
+          <a:lstStyle/>
+          <a:p>
+            <a:pPr lvl="0">
+              <a:defRPr sz="1800"/>
+            </a:pPr>
+            <a:r>
+              <a:rPr lang="de-AT" sz="3200" dirty="0" smtClean="0"/>
+              <a:t>Komplexität des Unternehmens</a:t>
+            </a:r>
+          </a:p>
+          <a:p>
+            <a:pPr lvl="0">
+              <a:defRPr sz="1800"/>
+            </a:pPr>
+            <a:r>
+              <a:rPr lang="de-AT" sz="3200" dirty="0" smtClean="0"/>
+              <a:t>Internationale Orientierung</a:t>
+            </a:r>
+          </a:p>
+          <a:p>
+            <a:pPr lvl="0">
+              <a:defRPr sz="1800"/>
+            </a:pPr>
+            <a:r>
+              <a:rPr lang="de-AT" sz="3200" dirty="0" smtClean="0"/>
+              <a:t>Kosten zweitrangig</a:t>
+            </a:r>
+          </a:p>
+          <a:p>
+            <a:pPr lvl="0">
+              <a:defRPr sz="1800"/>
+            </a:pPr>
+            <a:r>
+              <a:rPr lang="de-AT" sz="3200" dirty="0" smtClean="0"/>
+              <a:t>Unterstützung von Planung bis zu Ausführung</a:t>
+            </a:r>
+          </a:p>
+          <a:p>
+            <a:pPr lvl="0">
+              <a:defRPr sz="1800"/>
+            </a:pPr>
+            <a:r>
+              <a:rPr lang="de-AT" sz="3200" dirty="0" smtClean="0"/>
+              <a:t>Wenig Augenmerk auf Vertrieb, CRM und </a:t>
+            </a:r>
+            <a:r>
+              <a:rPr lang="de-AT" sz="3200" dirty="0" smtClean="0"/>
+              <a:t>Wartung</a:t>
+            </a:r>
+          </a:p>
+          <a:p>
+            <a:pPr lvl="0">
+              <a:defRPr sz="1800"/>
+            </a:pPr>
+            <a:r>
+              <a:rPr lang="en-CA" sz="3200" dirty="0" err="1" smtClean="0"/>
+              <a:t>Ein</a:t>
+            </a:r>
+            <a:r>
+              <a:rPr lang="en-CA" sz="3200" dirty="0" smtClean="0"/>
+              <a:t> ERP System f</a:t>
+            </a:r>
+            <a:r>
+              <a:rPr lang="de-AT" sz="3200" dirty="0" err="1" smtClean="0"/>
+              <a:t>ür</a:t>
+            </a:r>
+            <a:r>
+              <a:rPr lang="de-AT" sz="3200" dirty="0" smtClean="0"/>
+              <a:t> das </a:t>
+            </a:r>
+            <a:r>
+              <a:rPr lang="de-AT" sz="3200" dirty="0" err="1" smtClean="0"/>
+              <a:t>Gesammte</a:t>
+            </a:r>
+            <a:r>
+              <a:rPr lang="de-AT" sz="3200" dirty="0" smtClean="0"/>
+              <a:t> Unternehmen</a:t>
+            </a:r>
+            <a:endParaRPr lang="de-AT" sz="3200" dirty="0" smtClean="0"/>
+          </a:p>
+          <a:p>
+            <a:pPr lvl="0">
+              <a:defRPr sz="1800"/>
+            </a:pPr>
+            <a:endParaRPr lang="de-AT" sz="3200" dirty="0" smtClean="0"/>
+          </a:p>
+          <a:p>
+            <a:pPr lvl="0">
+              <a:defRPr sz="1800"/>
+            </a:pPr>
+            <a:endParaRPr lang="de-AT" sz="3200" dirty="0"/>
+          </a:p>
+        </p:txBody>
+      </p:sp>
     </p:spTree>
     <p:extLst>
       <p:ext uri="{BB962C8B-B14F-4D97-AF65-F5344CB8AC3E}">
-        <p14:creationId xmlns:p14="http://schemas.microsoft.com/office/powerpoint/2010/main" val="2683434265"/>
+        <p14:creationId xmlns:p14="http://schemas.microsoft.com/office/powerpoint/2010/main" val="3307975126"/>
       </p:ext>
     </p:extLst>
   </p:cSld>
@@ -6704,8 +6900,8 @@
         </p:blipFill>
         <p:spPr>
           <a:xfrm>
-            <a:off x="2611767" y="2603500"/>
-            <a:ext cx="7781266" cy="6286500"/>
+            <a:off x="1395662" y="1669652"/>
+            <a:ext cx="10082463" cy="8049600"/>
           </a:xfrm>
           <a:prstGeom prst="rect">
             <a:avLst/>
@@ -6715,7 +6911,7 @@
     </p:spTree>
     <p:extLst>
       <p:ext uri="{BB962C8B-B14F-4D97-AF65-F5344CB8AC3E}">
-        <p14:creationId xmlns:p14="http://schemas.microsoft.com/office/powerpoint/2010/main" val="764281377"/>
+        <p14:creationId xmlns:p14="http://schemas.microsoft.com/office/powerpoint/2010/main" val="2683434265"/>
       </p:ext>
     </p:extLst>
   </p:cSld>
@@ -6807,7 +7003,7 @@
           <a:bodyPr/>
           <a:lstStyle/>
           <a:p>
-            <a:endParaRPr lang="de-AT" dirty="0"/>
+            <a:endParaRPr lang="de-AT"/>
           </a:p>
         </p:txBody>
       </p:sp>
@@ -6833,8 +7029,8 @@
         </p:blipFill>
         <p:spPr>
           <a:xfrm>
-            <a:off x="2605412" y="2603500"/>
-            <a:ext cx="7793976" cy="6286500"/>
+            <a:off x="1299411" y="1543245"/>
+            <a:ext cx="10154652" cy="8203963"/>
           </a:xfrm>
           <a:prstGeom prst="rect">
             <a:avLst/>
@@ -6844,7 +7040,7 @@
     </p:spTree>
     <p:extLst>
       <p:ext uri="{BB962C8B-B14F-4D97-AF65-F5344CB8AC3E}">
-        <p14:creationId xmlns:p14="http://schemas.microsoft.com/office/powerpoint/2010/main" val="1151463258"/>
+        <p14:creationId xmlns:p14="http://schemas.microsoft.com/office/powerpoint/2010/main" val="764281377"/>
       </p:ext>
     </p:extLst>
   </p:cSld>
@@ -6909,6 +7105,264 @@
             </a:pPr>
             <a:r>
               <a:rPr lang="de-AT" sz="6000" dirty="0" smtClean="0"/>
+              <a:t>ERP Auswahl</a:t>
+            </a:r>
+            <a:endParaRPr sz="6000" dirty="0">
+              <a:solidFill>
+                <a:schemeClr val="tx2">
+                  <a:lumMod val="75000"/>
+                </a:schemeClr>
+              </a:solidFill>
+            </a:endParaRPr>
+          </a:p>
+        </p:txBody>
+      </p:sp>
+      <p:sp>
+        <p:nvSpPr>
+          <p:cNvPr id="2" name="Text Placeholder 1"/>
+          <p:cNvSpPr>
+            <a:spLocks noGrp="1"/>
+          </p:cNvSpPr>
+          <p:nvPr>
+            <p:ph type="body" idx="1"/>
+          </p:nvPr>
+        </p:nvSpPr>
+        <p:spPr/>
+        <p:txBody>
+          <a:bodyPr/>
+          <a:lstStyle/>
+          <a:p>
+            <a:endParaRPr lang="de-AT" dirty="0"/>
+          </a:p>
+        </p:txBody>
+      </p:sp>
+      <p:pic>
+        <p:nvPicPr>
+          <p:cNvPr id="3" name="Picture 2"/>
+          <p:cNvPicPr>
+            <a:picLocks noChangeAspect="1"/>
+          </p:cNvPicPr>
+          <p:nvPr/>
+        </p:nvPicPr>
+        <p:blipFill>
+          <a:blip r:embed="rId3">
+            <a:extLst>
+              <a:ext uri="{28A0092B-C50C-407E-A947-70E740481C1C}">
+                <a14:useLocalDpi xmlns:a14="http://schemas.microsoft.com/office/drawing/2010/main" val="0"/>
+              </a:ext>
+            </a:extLst>
+          </a:blip>
+          <a:stretch>
+            <a:fillRect/>
+          </a:stretch>
+        </p:blipFill>
+        <p:spPr>
+          <a:xfrm>
+            <a:off x="1227555" y="1704122"/>
+            <a:ext cx="9745245" cy="7860363"/>
+          </a:xfrm>
+          <a:prstGeom prst="rect">
+            <a:avLst/>
+          </a:prstGeom>
+        </p:spPr>
+      </p:pic>
+    </p:spTree>
+    <p:extLst>
+      <p:ext uri="{BB962C8B-B14F-4D97-AF65-F5344CB8AC3E}">
+        <p14:creationId xmlns:p14="http://schemas.microsoft.com/office/powerpoint/2010/main" val="1151463258"/>
+      </p:ext>
+    </p:extLst>
+  </p:cSld>
+  <p:clrMapOvr>
+    <a:masterClrMapping/>
+  </p:clrMapOvr>
+  <p:transition spd="med"/>
+  <p:timing>
+    <p:tnLst>
+      <p:par>
+        <p:cTn id="1" dur="indefinite" restart="never" nodeType="tmRoot"/>
+      </p:par>
+    </p:tnLst>
+  </p:timing>
+</p:sld>
+</file>
+
+<file path=ppt/slides/slide24.xml><?xml version="1.0" encoding="utf-8"?>
+<p:sld xmlns:a="http://schemas.openxmlformats.org/drawingml/2006/main" xmlns:r="http://schemas.openxmlformats.org/officeDocument/2006/relationships" xmlns:p="http://schemas.openxmlformats.org/presentationml/2006/main">
+  <p:cSld>
+    <p:spTree>
+      <p:nvGrpSpPr>
+        <p:cNvPr id="1" name=""/>
+        <p:cNvGrpSpPr/>
+        <p:nvPr/>
+      </p:nvGrpSpPr>
+      <p:grpSpPr>
+        <a:xfrm>
+          <a:off x="0" y="0"/>
+          <a:ext cx="0" cy="0"/>
+          <a:chOff x="0" y="0"/>
+          <a:chExt cx="0" cy="0"/>
+        </a:xfrm>
+      </p:grpSpPr>
+      <p:sp>
+        <p:nvSpPr>
+          <p:cNvPr id="35" name="Shape 35"/>
+          <p:cNvSpPr>
+            <a:spLocks noGrp="1"/>
+          </p:cNvSpPr>
+          <p:nvPr>
+            <p:ph type="title"/>
+          </p:nvPr>
+        </p:nvSpPr>
+        <p:spPr>
+          <a:xfrm>
+            <a:off x="2247900" y="133350"/>
+            <a:ext cx="10001250" cy="1314450"/>
+          </a:xfrm>
+          <a:prstGeom prst="rect">
+            <a:avLst/>
+          </a:prstGeom>
+        </p:spPr>
+        <p:txBody>
+          <a:bodyPr>
+            <a:normAutofit/>
+          </a:bodyPr>
+          <a:lstStyle/>
+          <a:p>
+            <a:pPr lvl="0" algn="l">
+              <a:defRPr sz="1800"/>
+            </a:pPr>
+            <a:r>
+              <a:rPr lang="de-AT" sz="6000" dirty="0" smtClean="0"/>
+              <a:t>ERP Auswahl</a:t>
+            </a:r>
+            <a:endParaRPr sz="6000" dirty="0">
+              <a:solidFill>
+                <a:schemeClr val="tx2">
+                  <a:lumMod val="75000"/>
+                </a:schemeClr>
+              </a:solidFill>
+            </a:endParaRPr>
+          </a:p>
+        </p:txBody>
+      </p:sp>
+      <p:sp>
+        <p:nvSpPr>
+          <p:cNvPr id="2" name="Text Placeholder 1"/>
+          <p:cNvSpPr>
+            <a:spLocks noGrp="1"/>
+          </p:cNvSpPr>
+          <p:nvPr>
+            <p:ph type="body" idx="1"/>
+          </p:nvPr>
+        </p:nvSpPr>
+        <p:spPr/>
+        <p:txBody>
+          <a:bodyPr/>
+          <a:lstStyle/>
+          <a:p>
+            <a:endParaRPr lang="de-AT" dirty="0"/>
+          </a:p>
+        </p:txBody>
+      </p:sp>
+      <p:pic>
+        <p:nvPicPr>
+          <p:cNvPr id="3" name="Picture 2"/>
+          <p:cNvPicPr>
+            <a:picLocks noChangeAspect="1"/>
+          </p:cNvPicPr>
+          <p:nvPr/>
+        </p:nvPicPr>
+        <p:blipFill>
+          <a:blip r:embed="rId3">
+            <a:extLst>
+              <a:ext uri="{28A0092B-C50C-407E-A947-70E740481C1C}">
+                <a14:useLocalDpi xmlns:a14="http://schemas.microsoft.com/office/drawing/2010/main" val="0"/>
+              </a:ext>
+            </a:extLst>
+          </a:blip>
+          <a:stretch>
+            <a:fillRect/>
+          </a:stretch>
+        </p:blipFill>
+        <p:spPr>
+          <a:xfrm>
+            <a:off x="952500" y="1729379"/>
+            <a:ext cx="10782089" cy="8024221"/>
+          </a:xfrm>
+          <a:prstGeom prst="rect">
+            <a:avLst/>
+          </a:prstGeom>
+        </p:spPr>
+      </p:pic>
+    </p:spTree>
+    <p:extLst>
+      <p:ext uri="{BB962C8B-B14F-4D97-AF65-F5344CB8AC3E}">
+        <p14:creationId xmlns:p14="http://schemas.microsoft.com/office/powerpoint/2010/main" val="289031834"/>
+      </p:ext>
+    </p:extLst>
+  </p:cSld>
+  <p:clrMapOvr>
+    <a:masterClrMapping/>
+  </p:clrMapOvr>
+  <p:transition spd="med"/>
+  <p:timing>
+    <p:tnLst>
+      <p:par>
+        <p:cTn id="1" dur="indefinite" restart="never" nodeType="tmRoot"/>
+      </p:par>
+    </p:tnLst>
+  </p:timing>
+</p:sld>
+</file>
+
+<file path=ppt/slides/slide25.xml><?xml version="1.0" encoding="utf-8"?>
+<p:sld xmlns:a="http://schemas.openxmlformats.org/drawingml/2006/main" xmlns:r="http://schemas.openxmlformats.org/officeDocument/2006/relationships" xmlns:p="http://schemas.openxmlformats.org/presentationml/2006/main">
+  <p:cSld>
+    <p:spTree>
+      <p:nvGrpSpPr>
+        <p:cNvPr id="1" name=""/>
+        <p:cNvGrpSpPr/>
+        <p:nvPr/>
+      </p:nvGrpSpPr>
+      <p:grpSpPr>
+        <a:xfrm>
+          <a:off x="0" y="0"/>
+          <a:ext cx="0" cy="0"/>
+          <a:chOff x="0" y="0"/>
+          <a:chExt cx="0" cy="0"/>
+        </a:xfrm>
+      </p:grpSpPr>
+      <p:sp>
+        <p:nvSpPr>
+          <p:cNvPr id="35" name="Shape 35"/>
+          <p:cNvSpPr>
+            <a:spLocks noGrp="1"/>
+          </p:cNvSpPr>
+          <p:nvPr>
+            <p:ph type="title"/>
+          </p:nvPr>
+        </p:nvSpPr>
+        <p:spPr>
+          <a:xfrm>
+            <a:off x="2247900" y="133350"/>
+            <a:ext cx="10001250" cy="1314450"/>
+          </a:xfrm>
+          <a:prstGeom prst="rect">
+            <a:avLst/>
+          </a:prstGeom>
+        </p:spPr>
+        <p:txBody>
+          <a:bodyPr>
+            <a:normAutofit/>
+          </a:bodyPr>
+          <a:lstStyle/>
+          <a:p>
+            <a:pPr lvl="0" algn="l">
+              <a:defRPr sz="1800"/>
+            </a:pPr>
+            <a:r>
+              <a:rPr lang="de-AT" sz="6000" dirty="0" smtClean="0"/>
               <a:t>Produktspektrum</a:t>
             </a:r>
             <a:endParaRPr sz="6000" dirty="0">
@@ -7061,7 +7515,7 @@
 </p:sld>
 </file>
 
-<file path=ppt/slides/slide24.xml><?xml version="1.0" encoding="utf-8"?>
+<file path=ppt/slides/slide26.xml><?xml version="1.0" encoding="utf-8"?>
 <p:sld xmlns:a="http://schemas.openxmlformats.org/drawingml/2006/main" xmlns:r="http://schemas.openxmlformats.org/officeDocument/2006/relationships" xmlns:p="http://schemas.openxmlformats.org/presentationml/2006/main">
   <p:cSld>
     <p:spTree>
@@ -7716,7 +8170,7 @@
             </a:pPr>
             <a:r>
               <a:rPr lang="de-AT" sz="6000" dirty="0" smtClean="0"/>
-              <a:t>Unternehmensstruktur</a:t>
+              <a:t>Finanzen</a:t>
             </a:r>
             <a:endParaRPr sz="6000" dirty="0">
               <a:solidFill>
@@ -7739,6 +8193,10 @@
           </p:nvPr>
         </p:nvSpPr>
         <p:spPr>
+          <a:xfrm>
+            <a:off x="880311" y="1929731"/>
+            <a:ext cx="11099800" cy="6286500"/>
+          </a:xfrm>
           <a:prstGeom prst="rect">
             <a:avLst/>
           </a:prstGeom>
@@ -7749,121 +8207,39 @@
           </a:bodyPr>
           <a:lstStyle/>
           <a:p>
-            <a:pPr>
-              <a:spcBef>
-                <a:spcPts val="600"/>
-              </a:spcBef>
-            </a:pPr>
-            <a:r>
-              <a:rPr lang="de-AT" sz="3000" dirty="0"/>
-              <a:t>Volkswagen AG – Muttergesellschaft des Volkswagen </a:t>
-            </a:r>
-            <a:r>
-              <a:rPr lang="de-AT" sz="3000" dirty="0" smtClean="0"/>
-              <a:t>Konzerns</a:t>
-            </a:r>
-          </a:p>
-          <a:p>
-            <a:pPr>
-              <a:spcBef>
-                <a:spcPts val="600"/>
-              </a:spcBef>
-            </a:pPr>
-            <a:endParaRPr lang="de-AT" sz="3000" dirty="0"/>
-          </a:p>
-          <a:p>
-            <a:pPr>
-              <a:spcBef>
-                <a:spcPts val="600"/>
-              </a:spcBef>
-            </a:pPr>
-            <a:r>
-              <a:rPr lang="de-AT" sz="3000" dirty="0"/>
-              <a:t>Konzernleitung:</a:t>
-            </a:r>
-          </a:p>
-          <a:p>
-            <a:pPr lvl="1">
-              <a:spcBef>
-                <a:spcPts val="600"/>
-              </a:spcBef>
-            </a:pPr>
-            <a:r>
-              <a:rPr lang="de-AT" sz="3000" dirty="0"/>
-              <a:t>Besteht aus Mitgliedern des Vorstands und Top-Managern</a:t>
-            </a:r>
-          </a:p>
-          <a:p>
-            <a:pPr lvl="1">
-              <a:spcBef>
-                <a:spcPts val="600"/>
-              </a:spcBef>
-            </a:pPr>
-            <a:r>
-              <a:rPr lang="de-AT" sz="3000" dirty="0"/>
-              <a:t>Sorgt dafür das Konzerninteressen bei Entscheidungen beachtet werden</a:t>
-            </a:r>
-          </a:p>
-          <a:p>
-            <a:pPr marL="457200" lvl="1" indent="0">
-              <a:spcBef>
-                <a:spcPts val="600"/>
-              </a:spcBef>
-              <a:buNone/>
-            </a:pPr>
-            <a:endParaRPr lang="de-AT" sz="3000" dirty="0"/>
-          </a:p>
-          <a:p>
-            <a:pPr>
-              <a:spcBef>
-                <a:spcPts val="600"/>
-              </a:spcBef>
-            </a:pPr>
-            <a:r>
-              <a:rPr lang="de-AT" sz="3000" dirty="0"/>
-              <a:t>Marken</a:t>
-            </a:r>
-          </a:p>
-          <a:p>
-            <a:pPr lvl="1">
-              <a:spcBef>
-                <a:spcPts val="600"/>
-              </a:spcBef>
-            </a:pPr>
-            <a:r>
-              <a:rPr lang="de-AT" sz="3000" dirty="0"/>
-              <a:t>Agieren nahezu unabhängig</a:t>
-            </a:r>
-          </a:p>
-          <a:p>
-            <a:pPr lvl="1">
-              <a:spcBef>
-                <a:spcPts val="600"/>
-              </a:spcBef>
-            </a:pPr>
-            <a:r>
-              <a:rPr lang="de-AT" sz="3000" dirty="0"/>
-              <a:t>Interessen des Konzerns werden beachtet</a:t>
-            </a:r>
-          </a:p>
-          <a:p>
-            <a:pPr lvl="0">
-              <a:lnSpc>
-                <a:spcPct val="250000"/>
-              </a:lnSpc>
-              <a:spcBef>
-                <a:spcPts val="1200"/>
-              </a:spcBef>
-              <a:defRPr sz="1800"/>
-            </a:pPr>
+            <a:pPr lvl="0">
+              <a:defRPr sz="1800"/>
+            </a:pPr>
+            <a:r>
+              <a:rPr lang="de-AT" sz="3200" dirty="0" smtClean="0"/>
+              <a:t>Umsatzerlös:  65.587 Millionen Euro</a:t>
+            </a:r>
             <a:endParaRPr lang="de-AT" sz="3200" dirty="0"/>
+          </a:p>
+          <a:p>
+            <a:pPr lvl="0">
+              <a:defRPr sz="1800"/>
+            </a:pPr>
+            <a:r>
+              <a:rPr lang="de-AT" sz="3200" dirty="0"/>
+              <a:t>Rückgang von 226 Millionen </a:t>
+            </a:r>
+          </a:p>
+          <a:p>
+            <a:pPr lvl="0">
+              <a:defRPr sz="1800"/>
+            </a:pPr>
+            <a:r>
+              <a:rPr lang="de-AT" sz="3200" dirty="0"/>
+              <a:t>Gewinnrückgang von 3 Milliarden Euro</a:t>
+            </a:r>
           </a:p>
         </p:txBody>
       </p:sp>
     </p:spTree>
     <p:extLst>
       <p:ext uri="{BB962C8B-B14F-4D97-AF65-F5344CB8AC3E}">
-        <p14:creationId xmlns:p14="http://schemas.microsoft.com/office/powerpoint/2010/main" val="2223607590"/>
+        <p14:creationId xmlns:p14="http://schemas.microsoft.com/office/powerpoint/2010/main" val="535220097"/>
       </p:ext>
     </p:extLst>
   </p:cSld>
@@ -7928,7 +8304,7 @@
             </a:pPr>
             <a:r>
               <a:rPr lang="de-AT" sz="6000" dirty="0" smtClean="0"/>
-              <a:t>Vorstand</a:t>
+              <a:t>Aktien</a:t>
             </a:r>
             <a:endParaRPr sz="6000" dirty="0">
               <a:solidFill>
@@ -7951,6 +8327,10 @@
           </p:nvPr>
         </p:nvSpPr>
         <p:spPr>
+          <a:xfrm>
+            <a:off x="663742" y="133350"/>
+            <a:ext cx="11099800" cy="6286500"/>
+          </a:xfrm>
           <a:prstGeom prst="rect">
             <a:avLst/>
           </a:prstGeom>
@@ -7961,48 +8341,73 @@
           </a:bodyPr>
           <a:lstStyle/>
           <a:p>
+            <a:pPr lvl="0">
+              <a:defRPr sz="1800"/>
+            </a:pPr>
+            <a:r>
+              <a:rPr lang="de-AT" sz="3200" dirty="0" smtClean="0"/>
+              <a:t>Stamm und Vorzugsaktien</a:t>
+            </a:r>
+          </a:p>
+          <a:p>
+            <a:pPr lvl="0">
+              <a:defRPr sz="1800"/>
+            </a:pPr>
             <a:r>
               <a:rPr lang="de-AT" sz="3200" dirty="0"/>
-              <a:t>Besteht aus 9 Vorstands-Mitgliedern</a:t>
-            </a:r>
-          </a:p>
-          <a:p>
-            <a:r>
-              <a:rPr lang="de-AT" sz="3200" dirty="0"/>
-              <a:t>Vorsitzender des Vorstands: Prof. Dr. Dr. h. c. </a:t>
-            </a:r>
-            <a:r>
-              <a:rPr lang="de-AT" sz="3200" dirty="0" err="1"/>
-              <a:t>mult</a:t>
-            </a:r>
-            <a:r>
-              <a:rPr lang="de-AT" sz="3200" dirty="0"/>
-              <a:t>. Martin Winterkorn</a:t>
-            </a:r>
-          </a:p>
-          <a:p>
-            <a:r>
-              <a:rPr lang="de-AT" sz="3200" dirty="0"/>
-              <a:t>Konzernweite Entscheidungen</a:t>
-            </a:r>
-          </a:p>
-          <a:p>
-            <a:r>
-              <a:rPr lang="de-AT" sz="3200" dirty="0"/>
-              <a:t>Zuteilung nach </a:t>
-            </a:r>
-            <a:r>
-              <a:rPr lang="de-AT" sz="3200" dirty="0" err="1" smtClean="0"/>
-              <a:t>Geschäftbereich</a:t>
+              <a:t>totale Marktkapital: bei 114,71 </a:t>
+            </a:r>
+            <a:r>
+              <a:rPr lang="de-AT" sz="3200" dirty="0" smtClean="0"/>
+              <a:t>Mrd. Euro</a:t>
+            </a:r>
+          </a:p>
+          <a:p>
+            <a:pPr lvl="0">
+              <a:defRPr sz="1800"/>
+            </a:pPr>
+            <a:r>
+              <a:rPr lang="de-AT" sz="3200" dirty="0" smtClean="0"/>
+              <a:t>Stand der Aktie: 250 Euro </a:t>
             </a:r>
             <a:endParaRPr lang="de-AT" sz="3200" dirty="0"/>
           </a:p>
         </p:txBody>
       </p:sp>
+      <p:pic>
+        <p:nvPicPr>
+          <p:cNvPr id="2" name="Picture 1"/>
+          <p:cNvPicPr>
+            <a:picLocks noChangeAspect="1"/>
+          </p:cNvPicPr>
+          <p:nvPr/>
+        </p:nvPicPr>
+        <p:blipFill>
+          <a:blip r:embed="rId3">
+            <a:extLst>
+              <a:ext uri="{28A0092B-C50C-407E-A947-70E740481C1C}">
+                <a14:useLocalDpi xmlns:a14="http://schemas.microsoft.com/office/drawing/2010/main" val="0"/>
+              </a:ext>
+            </a:extLst>
+          </a:blip>
+          <a:stretch>
+            <a:fillRect/>
+          </a:stretch>
+        </p:blipFill>
+        <p:spPr>
+          <a:xfrm>
+            <a:off x="663741" y="4932947"/>
+            <a:ext cx="11786123" cy="4185531"/>
+          </a:xfrm>
+          <a:prstGeom prst="rect">
+            <a:avLst/>
+          </a:prstGeom>
+        </p:spPr>
+      </p:pic>
     </p:spTree>
     <p:extLst>
       <p:ext uri="{BB962C8B-B14F-4D97-AF65-F5344CB8AC3E}">
-        <p14:creationId xmlns:p14="http://schemas.microsoft.com/office/powerpoint/2010/main" val="1947979431"/>
+        <p14:creationId xmlns:p14="http://schemas.microsoft.com/office/powerpoint/2010/main" val="2896883788"/>
       </p:ext>
     </p:extLst>
   </p:cSld>
@@ -8067,7 +8472,7 @@
             </a:pPr>
             <a:r>
               <a:rPr lang="de-AT" sz="6000" dirty="0" smtClean="0"/>
-              <a:t>Marken und Hierarchie</a:t>
+              <a:t>Aktionärsstruktur</a:t>
             </a:r>
             <a:endParaRPr sz="6000" dirty="0">
               <a:solidFill>
@@ -8081,40 +8486,317 @@
       </p:sp>
       <p:sp>
         <p:nvSpPr>
-          <p:cNvPr id="36" name="Shape 36"/>
-          <p:cNvSpPr>
-            <a:spLocks noGrp="1"/>
+          <p:cNvPr id="3" name="Text Placeholder 2"/>
+          <p:cNvSpPr>
+            <a:spLocks noGrp="1" noChangeArrowheads="1"/>
           </p:cNvSpPr>
           <p:nvPr>
             <p:ph type="body" idx="1"/>
           </p:nvPr>
         </p:nvSpPr>
-        <p:spPr>
-          <a:prstGeom prst="rect">
-            <a:avLst/>
-          </a:prstGeom>
-        </p:spPr>
-        <p:txBody>
-          <a:bodyPr>
-            <a:normAutofit/>
+        <p:spPr bwMode="auto">
+          <a:xfrm>
+            <a:off x="663499" y="2971097"/>
+            <a:ext cx="12341301" cy="4431983"/>
+          </a:xfrm>
+          <a:prstGeom prst="rect">
+            <a:avLst/>
+          </a:prstGeom>
+          <a:noFill/>
+          <a:ln>
+            <a:noFill/>
+          </a:ln>
+          <a:effectLst/>
+          <a:extLst>
+            <a:ext uri="{909E8E84-426E-40DD-AFC4-6F175D3DCCD1}">
+              <a14:hiddenFill xmlns:a14="http://schemas.microsoft.com/office/drawing/2010/main">
+                <a:solidFill>
+                  <a:schemeClr val="accent1"/>
+                </a:solidFill>
+              </a14:hiddenFill>
+            </a:ext>
+            <a:ext uri="{91240B29-F687-4F45-9708-019B960494DF}">
+              <a14:hiddenLine xmlns:a14="http://schemas.microsoft.com/office/drawing/2010/main" w="9525">
+                <a:solidFill>
+                  <a:schemeClr val="tx1"/>
+                </a:solidFill>
+                <a:miter lim="800000"/>
+                <a:headEnd/>
+                <a:tailEnd/>
+              </a14:hiddenLine>
+            </a:ext>
+            <a:ext uri="{AF507438-7753-43E0-B8FC-AC1667EBCBE1}">
+              <a14:hiddenEffects xmlns:a14="http://schemas.microsoft.com/office/drawing/2010/main">
+                <a:effectLst>
+                  <a:outerShdw dist="35921" dir="2700000" algn="ctr" rotWithShape="0">
+                    <a:schemeClr val="bg2"/>
+                  </a:outerShdw>
+                </a:effectLst>
+              </a14:hiddenEffects>
+            </a:ext>
+          </a:extLst>
+        </p:spPr>
+        <p:txBody>
+          <a:bodyPr vert="horz" wrap="square" lIns="0" tIns="0" rIns="0" bIns="0" numCol="1" anchor="ctr" anchorCtr="0" compatLnSpc="1">
+            <a:prstTxWarp prst="textNoShape">
+              <a:avLst/>
+            </a:prstTxWarp>
+            <a:spAutoFit/>
           </a:bodyPr>
           <a:lstStyle/>
           <a:p>
-            <a:pPr marL="0" indent="0">
+            <a:pPr marL="0" marR="0" lvl="0" indent="0" algn="l" defTabSz="914400" rtl="0" eaLnBrk="0" fontAlgn="base" latinLnBrk="0" hangingPunct="0">
+              <a:lnSpc>
+                <a:spcPct val="100000"/>
+              </a:lnSpc>
+              <a:spcBef>
+                <a:spcPct val="0"/>
+              </a:spcBef>
+              <a:spcAft>
+                <a:spcPct val="0"/>
+              </a:spcAft>
+              <a:buClrTx/>
+              <a:buSzTx/>
+              <a:buFontTx/>
               <a:buNone/>
-            </a:pPr>
-            <a:r>
-              <a:rPr lang="de-AT" sz="3200" dirty="0" smtClean="0"/>
-              <a:t>Tabelle…</a:t>
-            </a:r>
-            <a:endParaRPr lang="de-AT" sz="3200" dirty="0"/>
+              <a:tabLst/>
+            </a:pPr>
+            <a:r>
+              <a:rPr lang="de-DE" altLang="de-DE" sz="3200" dirty="0" smtClean="0"/>
+              <a:t>50,73% </a:t>
+            </a:r>
+            <a:r>
+              <a:rPr lang="de-DE" altLang="de-DE" sz="3200" dirty="0"/>
+              <a:t>Porsche Automobil Holding SE, </a:t>
+            </a:r>
+            <a:r>
+              <a:rPr lang="de-DE" altLang="de-DE" sz="3200" dirty="0" smtClean="0"/>
+              <a:t>Stuttgart</a:t>
+            </a:r>
+          </a:p>
+          <a:p>
+            <a:pPr marL="0" marR="0" lvl="0" indent="0" algn="l" defTabSz="914400" rtl="0" eaLnBrk="0" fontAlgn="base" latinLnBrk="0" hangingPunct="0">
+              <a:lnSpc>
+                <a:spcPct val="100000"/>
+              </a:lnSpc>
+              <a:spcBef>
+                <a:spcPct val="0"/>
+              </a:spcBef>
+              <a:spcAft>
+                <a:spcPct val="0"/>
+              </a:spcAft>
+              <a:buClrTx/>
+              <a:buSzTx/>
+              <a:buFontTx/>
+              <a:buNone/>
+              <a:tabLst/>
+            </a:pPr>
+            <a:r>
+              <a:rPr lang="de-DE" altLang="de-DE" sz="3200" dirty="0" smtClean="0"/>
+              <a:t>	10% </a:t>
+            </a:r>
+            <a:r>
+              <a:rPr lang="de-DE" altLang="de-DE" sz="3200" dirty="0" err="1" smtClean="0"/>
+              <a:t>Qatar</a:t>
+            </a:r>
+            <a:r>
+              <a:rPr lang="de-DE" altLang="de-DE" sz="3200" dirty="0" smtClean="0"/>
+              <a:t> Holding LLC</a:t>
+            </a:r>
+          </a:p>
+          <a:p>
+            <a:pPr marL="0" marR="0" lvl="0" indent="0" algn="l" defTabSz="914400" rtl="0" eaLnBrk="0" fontAlgn="base" latinLnBrk="0" hangingPunct="0">
+              <a:lnSpc>
+                <a:spcPct val="100000"/>
+              </a:lnSpc>
+              <a:spcBef>
+                <a:spcPct val="0"/>
+              </a:spcBef>
+              <a:spcAft>
+                <a:spcPct val="0"/>
+              </a:spcAft>
+              <a:buClrTx/>
+              <a:buSzTx/>
+              <a:buFontTx/>
+              <a:buNone/>
+              <a:tabLst/>
+            </a:pPr>
+            <a:r>
+              <a:rPr lang="de-DE" altLang="de-DE" sz="3200" dirty="0"/>
+              <a:t>	</a:t>
+            </a:r>
+            <a:r>
+              <a:rPr lang="de-DE" altLang="de-DE" sz="3200" dirty="0" smtClean="0"/>
+              <a:t>90% Familien Porsche und </a:t>
+            </a:r>
+            <a:r>
+              <a:rPr lang="de-DE" altLang="de-DE" sz="3200" dirty="0" err="1" smtClean="0"/>
+              <a:t>Piech</a:t>
+            </a:r>
+            <a:endParaRPr lang="de-DE" altLang="de-DE" sz="3200" dirty="0" smtClean="0"/>
+          </a:p>
+          <a:p>
+            <a:pPr marL="0" marR="0" lvl="0" indent="0" algn="l" defTabSz="914400" rtl="0" eaLnBrk="0" fontAlgn="base" latinLnBrk="0" hangingPunct="0">
+              <a:lnSpc>
+                <a:spcPct val="100000"/>
+              </a:lnSpc>
+              <a:spcBef>
+                <a:spcPct val="0"/>
+              </a:spcBef>
+              <a:spcAft>
+                <a:spcPct val="0"/>
+              </a:spcAft>
+              <a:buClrTx/>
+              <a:buSzTx/>
+              <a:buFontTx/>
+              <a:buNone/>
+              <a:tabLst/>
+            </a:pPr>
+            <a:endParaRPr lang="de-DE" altLang="de-DE" sz="3200" dirty="0" smtClean="0"/>
+          </a:p>
+          <a:p>
+            <a:pPr marL="0" marR="0" lvl="0" indent="0" algn="l" defTabSz="914400" rtl="0" eaLnBrk="0" fontAlgn="base" latinLnBrk="0" hangingPunct="0">
+              <a:lnSpc>
+                <a:spcPct val="100000"/>
+              </a:lnSpc>
+              <a:spcBef>
+                <a:spcPct val="0"/>
+              </a:spcBef>
+              <a:spcAft>
+                <a:spcPct val="0"/>
+              </a:spcAft>
+              <a:buClrTx/>
+              <a:buSzTx/>
+              <a:buFontTx/>
+              <a:buNone/>
+              <a:tabLst/>
+            </a:pPr>
+            <a:r>
+              <a:rPr lang="de-DE" altLang="de-DE" sz="3200" dirty="0" smtClean="0"/>
+              <a:t>20,00% </a:t>
+            </a:r>
+            <a:r>
+              <a:rPr lang="de-DE" altLang="de-DE" sz="3200" dirty="0"/>
+              <a:t>Land </a:t>
+            </a:r>
+            <a:r>
+              <a:rPr lang="de-DE" altLang="de-DE" sz="3200" dirty="0" smtClean="0"/>
+              <a:t>Niedersachsen</a:t>
+            </a:r>
+            <a:endParaRPr lang="de-DE" altLang="de-DE" sz="3200" dirty="0" smtClean="0"/>
+          </a:p>
+          <a:p>
+            <a:pPr marL="0" marR="0" lvl="0" indent="0" algn="l" defTabSz="914400" rtl="0" eaLnBrk="0" fontAlgn="base" latinLnBrk="0" hangingPunct="0">
+              <a:lnSpc>
+                <a:spcPct val="100000"/>
+              </a:lnSpc>
+              <a:spcBef>
+                <a:spcPct val="0"/>
+              </a:spcBef>
+              <a:spcAft>
+                <a:spcPct val="0"/>
+              </a:spcAft>
+              <a:buClrTx/>
+              <a:buSzTx/>
+              <a:buFontTx/>
+              <a:buNone/>
+              <a:tabLst/>
+            </a:pPr>
+            <a:endParaRPr lang="de-DE" altLang="de-DE" sz="3200" dirty="0" smtClean="0"/>
+          </a:p>
+          <a:p>
+            <a:pPr marL="0" marR="0" lvl="0" indent="0" algn="l" defTabSz="914400" rtl="0" eaLnBrk="0" fontAlgn="base" latinLnBrk="0" hangingPunct="0">
+              <a:lnSpc>
+                <a:spcPct val="100000"/>
+              </a:lnSpc>
+              <a:spcBef>
+                <a:spcPct val="0"/>
+              </a:spcBef>
+              <a:spcAft>
+                <a:spcPct val="0"/>
+              </a:spcAft>
+              <a:buClrTx/>
+              <a:buSzTx/>
+              <a:buFontTx/>
+              <a:buNone/>
+              <a:tabLst/>
+            </a:pPr>
+            <a:r>
+              <a:rPr lang="de-DE" altLang="de-DE" sz="3200" dirty="0" smtClean="0"/>
+              <a:t>17,00</a:t>
+            </a:r>
+            <a:r>
+              <a:rPr lang="de-DE" altLang="de-DE" sz="3200" dirty="0" smtClean="0"/>
+              <a:t>% </a:t>
+            </a:r>
+            <a:r>
+              <a:rPr lang="de-DE" altLang="de-DE" sz="3200" dirty="0" err="1"/>
+              <a:t>Qatar</a:t>
+            </a:r>
+            <a:r>
+              <a:rPr lang="de-DE" altLang="de-DE" sz="3200" dirty="0"/>
+              <a:t> Holding </a:t>
+            </a:r>
+            <a:r>
+              <a:rPr lang="de-DE" altLang="de-DE" sz="3200" dirty="0" smtClean="0"/>
+              <a:t>LLC</a:t>
+            </a:r>
+          </a:p>
+          <a:p>
+            <a:pPr marL="0" marR="0" lvl="0" indent="0" algn="l" defTabSz="914400" rtl="0" eaLnBrk="0" fontAlgn="base" latinLnBrk="0" hangingPunct="0">
+              <a:lnSpc>
+                <a:spcPct val="100000"/>
+              </a:lnSpc>
+              <a:spcBef>
+                <a:spcPct val="0"/>
+              </a:spcBef>
+              <a:spcAft>
+                <a:spcPct val="0"/>
+              </a:spcAft>
+              <a:buClrTx/>
+              <a:buSzTx/>
+              <a:buFontTx/>
+              <a:buNone/>
+              <a:tabLst/>
+            </a:pPr>
+            <a:endParaRPr lang="de-DE" altLang="de-DE" sz="3200" dirty="0" smtClean="0"/>
+          </a:p>
+          <a:p>
+            <a:pPr marL="0" marR="0" lvl="0" indent="0" algn="l" defTabSz="914400" rtl="0" eaLnBrk="0" fontAlgn="base" latinLnBrk="0" hangingPunct="0">
+              <a:lnSpc>
+                <a:spcPct val="100000"/>
+              </a:lnSpc>
+              <a:spcBef>
+                <a:spcPct val="0"/>
+              </a:spcBef>
+              <a:spcAft>
+                <a:spcPct val="0"/>
+              </a:spcAft>
+              <a:buClrTx/>
+              <a:buSzTx/>
+              <a:buFontTx/>
+              <a:buNone/>
+              <a:tabLst/>
+            </a:pPr>
+            <a:r>
+              <a:rPr lang="de-DE" altLang="de-DE" sz="3200" dirty="0" smtClean="0"/>
+              <a:t>12,30</a:t>
+            </a:r>
+            <a:r>
+              <a:rPr lang="de-DE" altLang="de-DE" sz="3200" dirty="0" smtClean="0"/>
+              <a:t>% </a:t>
+            </a:r>
+            <a:r>
+              <a:rPr lang="de-DE" altLang="de-DE" sz="3200" dirty="0"/>
+              <a:t>Weitere</a:t>
+            </a:r>
           </a:p>
         </p:txBody>
       </p:sp>
     </p:spTree>
     <p:extLst>
       <p:ext uri="{BB962C8B-B14F-4D97-AF65-F5344CB8AC3E}">
-        <p14:creationId xmlns:p14="http://schemas.microsoft.com/office/powerpoint/2010/main" val="143233847"/>
+        <p14:creationId xmlns:p14="http://schemas.microsoft.com/office/powerpoint/2010/main" val="539779500"/>
       </p:ext>
     </p:extLst>
   </p:cSld>
@@ -8179,7 +8861,7 @@
             </a:pPr>
             <a:r>
               <a:rPr lang="de-AT" sz="6000" dirty="0" smtClean="0"/>
-              <a:t>Logistik</a:t>
+              <a:t>Übernahme von Porsche</a:t>
             </a:r>
             <a:endParaRPr sz="6000" dirty="0">
               <a:solidFill>
@@ -8193,7 +8875,7 @@
       </p:sp>
       <p:sp>
         <p:nvSpPr>
-          <p:cNvPr id="36" name="Shape 36"/>
+          <p:cNvPr id="2" name="Text Placeholder 1"/>
           <p:cNvSpPr>
             <a:spLocks noGrp="1"/>
           </p:cNvSpPr>
@@ -8201,86 +8883,49 @@
             <p:ph type="body" idx="1"/>
           </p:nvPr>
         </p:nvSpPr>
-        <p:spPr>
-          <a:prstGeom prst="rect">
-            <a:avLst/>
-          </a:prstGeom>
-        </p:spPr>
-        <p:txBody>
-          <a:bodyPr>
-            <a:normAutofit/>
-          </a:bodyPr>
-          <a:lstStyle/>
-          <a:p>
-            <a:pPr>
-              <a:spcBef>
-                <a:spcPts val="1800"/>
-              </a:spcBef>
-            </a:pPr>
-            <a:r>
-              <a:rPr lang="de-AT" sz="3200" dirty="0"/>
-              <a:t>Sitz in Wolfsburg</a:t>
-            </a:r>
-          </a:p>
-          <a:p>
-            <a:pPr>
-              <a:spcBef>
-                <a:spcPts val="1800"/>
-              </a:spcBef>
-            </a:pPr>
-            <a:r>
-              <a:rPr lang="de-AT" sz="3200" dirty="0"/>
-              <a:t>Nicht nur integrierte Logistik</a:t>
-            </a:r>
-          </a:p>
-          <a:p>
-            <a:pPr>
-              <a:spcBef>
-                <a:spcPts val="1800"/>
-              </a:spcBef>
-            </a:pPr>
-            <a:r>
-              <a:rPr lang="de-AT" sz="3200" dirty="0"/>
-              <a:t>Auch externe Aufträge</a:t>
-            </a:r>
-          </a:p>
-          <a:p>
-            <a:pPr>
-              <a:spcBef>
-                <a:spcPts val="1800"/>
-              </a:spcBef>
-            </a:pPr>
-            <a:r>
-              <a:rPr lang="de-AT" sz="3200" dirty="0"/>
-              <a:t>Betreut gesamte Supply-Chain</a:t>
-            </a:r>
-          </a:p>
-          <a:p>
-            <a:pPr>
-              <a:spcBef>
-                <a:spcPts val="1800"/>
-              </a:spcBef>
-            </a:pPr>
-            <a:endParaRPr lang="de-AT" sz="3200" dirty="0"/>
-          </a:p>
-          <a:p>
-            <a:pPr>
-              <a:spcBef>
-                <a:spcPts val="1800"/>
-              </a:spcBef>
-            </a:pPr>
-            <a:r>
-              <a:rPr lang="de-AT" sz="3200" dirty="0"/>
-              <a:t>Zusätzlich auch: Lagerung, Transport, Verpackung und Entsorgung</a:t>
-            </a:r>
-            <a:endParaRPr lang="de-AT" sz="3200" dirty="0"/>
-          </a:p>
-        </p:txBody>
-      </p:sp>
+        <p:spPr/>
+        <p:txBody>
+          <a:bodyPr/>
+          <a:lstStyle/>
+          <a:p>
+            <a:endParaRPr lang="de-AT" dirty="0"/>
+          </a:p>
+        </p:txBody>
+      </p:sp>
+      <p:pic>
+        <p:nvPicPr>
+          <p:cNvPr id="4" name="Picture 3"/>
+          <p:cNvPicPr>
+            <a:picLocks noChangeAspect="1"/>
+          </p:cNvPicPr>
+          <p:nvPr/>
+        </p:nvPicPr>
+        <p:blipFill>
+          <a:blip r:embed="rId3">
+            <a:extLst>
+              <a:ext uri="{28A0092B-C50C-407E-A947-70E740481C1C}">
+                <a14:useLocalDpi xmlns:a14="http://schemas.microsoft.com/office/drawing/2010/main" val="0"/>
+              </a:ext>
+            </a:extLst>
+          </a:blip>
+          <a:stretch>
+            <a:fillRect/>
+          </a:stretch>
+        </p:blipFill>
+        <p:spPr>
+          <a:xfrm>
+            <a:off x="192506" y="1662256"/>
+            <a:ext cx="12812294" cy="7566680"/>
+          </a:xfrm>
+          <a:prstGeom prst="rect">
+            <a:avLst/>
+          </a:prstGeom>
+        </p:spPr>
+      </p:pic>
     </p:spTree>
     <p:extLst>
       <p:ext uri="{BB962C8B-B14F-4D97-AF65-F5344CB8AC3E}">
-        <p14:creationId xmlns:p14="http://schemas.microsoft.com/office/powerpoint/2010/main" val="3024887283"/>
+        <p14:creationId xmlns:p14="http://schemas.microsoft.com/office/powerpoint/2010/main" val="1773597712"/>
       </p:ext>
     </p:extLst>
   </p:cSld>

</xml_diff>